<commit_message>
added flow chart to poster
</commit_message>
<xml_diff>
--- a/TeamCtrl-XPoster.pptx
+++ b/TeamCtrl-XPoster.pptx
@@ -215,7 +215,7 @@
           </a:lstStyle>
           <a:p>
             <a:fld id="{225BAF9D-FE07-6A49-A65C-640C238374BA}" type="datetime1">
-              <a:t>12/2/2016</a:t>
+              <a:t>12/3/2016</a:t>
             </a:fld>
             <a:endParaRPr lang="en-US"/>
           </a:p>
@@ -379,7 +379,7 @@
           </a:lstStyle>
           <a:p>
             <a:fld id="{C452C735-D8AC-6B47-A55A-6D5DBB87B596}" type="datetime1">
-              <a:t>12/2/2016</a:t>
+              <a:t>12/3/2016</a:t>
             </a:fld>
             <a:endParaRPr lang="en-US"/>
           </a:p>
@@ -893,7 +893,7 @@
           <a:lstStyle/>
           <a:p>
             <a:fld id="{12882538-7F94-AF4E-AC0E-2D4DA7163C25}" type="datetime1">
-              <a:t>12/2/2016</a:t>
+              <a:t>12/3/2016</a:t>
             </a:fld>
             <a:endParaRPr lang="en-US"/>
           </a:p>
@@ -1085,7 +1085,7 @@
           <a:lstStyle/>
           <a:p>
             <a:fld id="{B7E96A53-3239-8247-A129-F7433496CD79}" type="datetime1">
-              <a:t>12/2/2016</a:t>
+              <a:t>12/3/2016</a:t>
             </a:fld>
             <a:endParaRPr lang="en-US"/>
           </a:p>
@@ -1287,7 +1287,7 @@
           <a:lstStyle/>
           <a:p>
             <a:fld id="{33C20823-755A-3644-9771-D9245392EAAC}" type="datetime1">
-              <a:t>12/2/2016</a:t>
+              <a:t>12/3/2016</a:t>
             </a:fld>
             <a:endParaRPr lang="en-US"/>
           </a:p>
@@ -1479,7 +1479,7 @@
           <a:lstStyle/>
           <a:p>
             <a:fld id="{AFDF9FB8-A819-0644-B738-AB774D89CEFA}" type="datetime1">
-              <a:t>12/2/2016</a:t>
+              <a:t>12/3/2016</a:t>
             </a:fld>
             <a:endParaRPr lang="en-US"/>
           </a:p>
@@ -1748,7 +1748,7 @@
           <a:lstStyle/>
           <a:p>
             <a:fld id="{1BDCE683-4210-974B-9997-899DF9993CFA}" type="datetime1">
-              <a:t>12/2/2016</a:t>
+              <a:t>12/3/2016</a:t>
             </a:fld>
             <a:endParaRPr lang="en-US"/>
           </a:p>
@@ -2057,7 +2057,7 @@
           <a:lstStyle/>
           <a:p>
             <a:fld id="{BE850229-3D02-A441-9DE1-FD6F7F2646C5}" type="datetime1">
-              <a:t>12/2/2016</a:t>
+              <a:t>12/3/2016</a:t>
             </a:fld>
             <a:endParaRPr lang="en-US"/>
           </a:p>
@@ -2500,7 +2500,7 @@
           <a:lstStyle/>
           <a:p>
             <a:fld id="{AE4CB381-A10C-304B-B59A-BD82FBB5F212}" type="datetime1">
-              <a:t>12/2/2016</a:t>
+              <a:t>12/3/2016</a:t>
             </a:fld>
             <a:endParaRPr lang="en-US"/>
           </a:p>
@@ -2641,7 +2641,7 @@
           <a:lstStyle/>
           <a:p>
             <a:fld id="{15578EB0-43FE-8C49-A895-C3E882EECC5D}" type="datetime1">
-              <a:t>12/2/2016</a:t>
+              <a:t>12/3/2016</a:t>
             </a:fld>
             <a:endParaRPr lang="en-US"/>
           </a:p>
@@ -2760,7 +2760,7 @@
           <a:lstStyle/>
           <a:p>
             <a:fld id="{A2C466C8-91FA-1A4C-A29C-D4D236A51FE3}" type="datetime1">
-              <a:t>12/2/2016</a:t>
+              <a:t>12/3/2016</a:t>
             </a:fld>
             <a:endParaRPr lang="en-US"/>
           </a:p>
@@ -3059,7 +3059,7 @@
           <a:lstStyle/>
           <a:p>
             <a:fld id="{BB332400-AED5-2C46-BF66-A2FCCE99A32E}" type="datetime1">
-              <a:t>12/2/2016</a:t>
+              <a:t>12/3/2016</a:t>
             </a:fld>
             <a:endParaRPr lang="en-US"/>
           </a:p>
@@ -3335,7 +3335,7 @@
           <a:lstStyle/>
           <a:p>
             <a:fld id="{77669421-7F0D-6A4D-A945-B8164E1B877D}" type="datetime1">
-              <a:t>12/2/2016</a:t>
+              <a:t>12/3/2016</a:t>
             </a:fld>
             <a:endParaRPr lang="en-US"/>
           </a:p>
@@ -4066,7 +4066,7 @@
         </p:nvSpPr>
         <p:spPr>
           <a:xfrm>
-            <a:off x="11506200" y="20955000"/>
+            <a:off x="11734800" y="29260800"/>
             <a:ext cx="9118600" cy="2308324"/>
           </a:xfrm>
           <a:prstGeom prst="rect">
@@ -4120,7 +4120,7 @@
         </p:nvSpPr>
         <p:spPr>
           <a:xfrm>
-            <a:off x="1371600" y="20955000"/>
+            <a:off x="1371600" y="29260800"/>
             <a:ext cx="9118600" cy="2308324"/>
           </a:xfrm>
           <a:prstGeom prst="rect">
@@ -4184,7 +4184,7 @@
         </p:nvSpPr>
         <p:spPr>
           <a:xfrm>
-            <a:off x="2559050" y="19818068"/>
+            <a:off x="2559050" y="28123868"/>
             <a:ext cx="6743700" cy="646331"/>
           </a:xfrm>
           <a:prstGeom prst="rect">
@@ -4217,7 +4217,7 @@
         </p:nvSpPr>
         <p:spPr>
           <a:xfrm>
-            <a:off x="12693650" y="19818068"/>
+            <a:off x="12922250" y="28332635"/>
             <a:ext cx="6743700" cy="646331"/>
           </a:xfrm>
           <a:prstGeom prst="rect">
@@ -4242,6 +4242,36 @@
           </a:p>
         </p:txBody>
       </p:sp>
+      <p:pic>
+        <p:nvPicPr>
+          <p:cNvPr id="2" name="Picture 1"/>
+          <p:cNvPicPr>
+            <a:picLocks noChangeAspect="1"/>
+          </p:cNvPicPr>
+          <p:nvPr/>
+        </p:nvPicPr>
+        <p:blipFill>
+          <a:blip r:embed="rId4">
+            <a:extLst>
+              <a:ext uri="{28A0092B-C50C-407E-A947-70E740481C1C}">
+                <a14:useLocalDpi xmlns:a14="http://schemas.microsoft.com/office/drawing/2010/main" val="0"/>
+              </a:ext>
+            </a:extLst>
+          </a:blip>
+          <a:stretch>
+            <a:fillRect/>
+          </a:stretch>
+        </p:blipFill>
+        <p:spPr>
+          <a:xfrm>
+            <a:off x="0" y="9027731"/>
+            <a:ext cx="21945600" cy="19023070"/>
+          </a:xfrm>
+          <a:prstGeom prst="rect">
+            <a:avLst/>
+          </a:prstGeom>
+        </p:spPr>
+      </p:pic>
     </p:spTree>
     <p:extLst>
       <p:ext uri="{BB962C8B-B14F-4D97-AF65-F5344CB8AC3E}">
@@ -5326,6 +5356,27 @@
 </file>
 
 <file path=customXml/item2.xml><?xml version="1.0" encoding="utf-8"?>
+<p:properties xmlns:p="http://schemas.microsoft.com/office/2006/metadata/properties" xmlns:xsi="http://www.w3.org/2001/XMLSchema-instance" xmlns:pc="http://schemas.microsoft.com/office/infopath/2007/PartnerControls">
+  <documentManagement>
+    <_dlc_DocId xmlns="db534a5e-1222-4db9-a6da-47c142019016">RUP43XDAYXKA-2-4395</_dlc_DocId>
+    <_dlc_DocIdUrl xmlns="db534a5e-1222-4db9-a6da-47c142019016">
+      <Url>https://staffnet.library.utah.edu/personal/u0031319/_layouts/DocIdRedir.aspx?ID=RUP43XDAYXKA-2-4395</Url>
+      <Description>RUP43XDAYXKA-2-4395</Description>
+    </_dlc_DocIdUrl>
+  </documentManagement>
+</p:properties>
+</file>
+
+<file path=customXml/item3.xml><?xml version="1.0" encoding="utf-8"?>
+<?mso-contentType ?>
+<FormTemplates xmlns="http://schemas.microsoft.com/sharepoint/v3/contenttype/forms">
+  <Display>DocumentLibraryForm</Display>
+  <Edit>DocumentLibraryForm</Edit>
+  <New>DocumentLibraryForm</New>
+</FormTemplates>
+</file>
+
+<file path=customXml/item4.xml><?xml version="1.0" encoding="utf-8"?>
 <?mso-contentType ?>
 <spe:Receivers xmlns:spe="http://schemas.microsoft.com/sharepoint/events">
   <Receiver>
@@ -5371,27 +5422,6 @@
 </spe:Receivers>
 </file>
 
-<file path=customXml/item3.xml><?xml version="1.0" encoding="utf-8"?>
-<?mso-contentType ?>
-<FormTemplates xmlns="http://schemas.microsoft.com/sharepoint/v3/contenttype/forms">
-  <Display>DocumentLibraryForm</Display>
-  <Edit>DocumentLibraryForm</Edit>
-  <New>DocumentLibraryForm</New>
-</FormTemplates>
-</file>
-
-<file path=customXml/item4.xml><?xml version="1.0" encoding="utf-8"?>
-<p:properties xmlns:p="http://schemas.microsoft.com/office/2006/metadata/properties" xmlns:xsi="http://www.w3.org/2001/XMLSchema-instance" xmlns:pc="http://schemas.microsoft.com/office/infopath/2007/PartnerControls">
-  <documentManagement>
-    <_dlc_DocId xmlns="db534a5e-1222-4db9-a6da-47c142019016">RUP43XDAYXKA-2-4395</_dlc_DocId>
-    <_dlc_DocIdUrl xmlns="db534a5e-1222-4db9-a6da-47c142019016">
-      <Url>https://staffnet.library.utah.edu/personal/u0031319/_layouts/DocIdRedir.aspx?ID=RUP43XDAYXKA-2-4395</Url>
-      <Description>RUP43XDAYXKA-2-4395</Description>
-    </_dlc_DocIdUrl>
-  </documentManagement>
-</p:properties>
-</file>
-
 <file path=customXml/itemProps1.xml><?xml version="1.0" encoding="utf-8"?>
 <ds:datastoreItem xmlns:ds="http://schemas.openxmlformats.org/officeDocument/2006/customXml" ds:itemID="{081FD53D-2ABA-4B69-925F-BDB723FA0A79}">
   <ds:schemaRefs>
@@ -5411,9 +5441,17 @@
 </file>
 
 <file path=customXml/itemProps2.xml><?xml version="1.0" encoding="utf-8"?>
-<ds:datastoreItem xmlns:ds="http://schemas.openxmlformats.org/officeDocument/2006/customXml" ds:itemID="{CA62BF48-A576-4D85-A587-1744F931CE21}">
+<ds:datastoreItem xmlns:ds="http://schemas.openxmlformats.org/officeDocument/2006/customXml" ds:itemID="{188DB492-5879-4998-90FC-E865BEF428C1}">
   <ds:schemaRefs>
-    <ds:schemaRef ds:uri="http://schemas.microsoft.com/sharepoint/events"/>
+    <ds:schemaRef ds:uri="db534a5e-1222-4db9-a6da-47c142019016"/>
+    <ds:schemaRef ds:uri="http://schemas.microsoft.com/office/2006/documentManagement/types"/>
+    <ds:schemaRef ds:uri="http://www.w3.org/XML/1998/namespace"/>
+    <ds:schemaRef ds:uri="http://purl.org/dc/elements/1.1/"/>
+    <ds:schemaRef ds:uri="http://purl.org/dc/terms/"/>
+    <ds:schemaRef ds:uri="http://purl.org/dc/dcmitype/"/>
+    <ds:schemaRef ds:uri="http://schemas.microsoft.com/office/infopath/2007/PartnerControls"/>
+    <ds:schemaRef ds:uri="http://schemas.openxmlformats.org/package/2006/metadata/core-properties"/>
+    <ds:schemaRef ds:uri="http://schemas.microsoft.com/office/2006/metadata/properties"/>
   </ds:schemaRefs>
 </ds:datastoreItem>
 </file>
@@ -5427,17 +5465,9 @@
 </file>
 
 <file path=customXml/itemProps4.xml><?xml version="1.0" encoding="utf-8"?>
-<ds:datastoreItem xmlns:ds="http://schemas.openxmlformats.org/officeDocument/2006/customXml" ds:itemID="{188DB492-5879-4998-90FC-E865BEF428C1}">
+<ds:datastoreItem xmlns:ds="http://schemas.openxmlformats.org/officeDocument/2006/customXml" ds:itemID="{CA62BF48-A576-4D85-A587-1744F931CE21}">
   <ds:schemaRefs>
-    <ds:schemaRef ds:uri="http://schemas.microsoft.com/office/infopath/2007/PartnerControls"/>
-    <ds:schemaRef ds:uri="db534a5e-1222-4db9-a6da-47c142019016"/>
-    <ds:schemaRef ds:uri="http://purl.org/dc/terms/"/>
-    <ds:schemaRef ds:uri="http://purl.org/dc/elements/1.1/"/>
-    <ds:schemaRef ds:uri="http://purl.org/dc/dcmitype/"/>
-    <ds:schemaRef ds:uri="http://schemas.openxmlformats.org/package/2006/metadata/core-properties"/>
-    <ds:schemaRef ds:uri="http://schemas.microsoft.com/office/2006/documentManagement/types"/>
-    <ds:schemaRef ds:uri="http://schemas.microsoft.com/office/2006/metadata/properties"/>
-    <ds:schemaRef ds:uri="http://www.w3.org/XML/1998/namespace"/>
+    <ds:schemaRef ds:uri="http://schemas.microsoft.com/sharepoint/events"/>
   </ds:schemaRefs>
 </ds:datastoreItem>
 </file>
</xml_diff>

<commit_message>
fixed a few things on poster and resubmitted
</commit_message>
<xml_diff>
--- a/TeamCtrl-XPoster.pptx
+++ b/TeamCtrl-XPoster.pptx
@@ -2,13 +2,13 @@
 <file path=ppt/presentation.xml><?xml version="1.0" encoding="utf-8"?>
 <p:presentation xmlns:a="http://schemas.openxmlformats.org/drawingml/2006/main" xmlns:r="http://schemas.openxmlformats.org/officeDocument/2006/relationships" xmlns:p="http://schemas.openxmlformats.org/presentationml/2006/main">
   <p:sldMasterIdLst>
-    <p:sldMasterId id="2147483648" r:id="rId5"/>
+    <p:sldMasterId id="2147483648" r:id="rId1"/>
   </p:sldMasterIdLst>
   <p:notesMasterIdLst>
-    <p:notesMasterId r:id="rId7"/>
+    <p:notesMasterId r:id="rId3"/>
   </p:notesMasterIdLst>
   <p:sldIdLst>
-    <p:sldId id="256" r:id="rId8"/>
+    <p:sldId id="256" r:id="rId2"/>
   </p:sldIdLst>
   <p:sldSz cx="21945600" cy="32918400"/>
   <p:notesSz cx="6858000" cy="9144000"/>
@@ -28,7 +28,7 @@
       <a:buFontTx/>
       <a:buNone/>
       <a:tabLst/>
-      <a:defRPr b="0" baseline="0" cap="none" i="0" spc="0" strike="noStrike" sz="1800" u="none" kumimoji="0" normalizeH="0">
+      <a:defRPr kumimoji="0" sz="1800" b="0" i="0" u="none" strike="noStrike" cap="none" spc="0" normalizeH="0" baseline="0">
         <a:ln>
           <a:noFill/>
         </a:ln>
@@ -54,7 +54,7 @@
       <a:buFontTx/>
       <a:buNone/>
       <a:tabLst/>
-      <a:defRPr b="0" baseline="0" cap="none" i="0" spc="0" strike="noStrike" sz="8600" u="none" kumimoji="0" normalizeH="0">
+      <a:defRPr kumimoji="0" sz="8600" b="0" i="0" u="none" strike="noStrike" cap="none" spc="0" normalizeH="0" baseline="0">
         <a:ln>
           <a:noFill/>
         </a:ln>
@@ -84,7 +84,7 @@
       <a:buFontTx/>
       <a:buNone/>
       <a:tabLst/>
-      <a:defRPr b="0" baseline="0" cap="none" i="0" spc="0" strike="noStrike" sz="8600" u="none" kumimoji="0" normalizeH="0">
+      <a:defRPr kumimoji="0" sz="8600" b="0" i="0" u="none" strike="noStrike" cap="none" spc="0" normalizeH="0" baseline="0">
         <a:ln>
           <a:noFill/>
         </a:ln>
@@ -114,7 +114,7 @@
       <a:buFontTx/>
       <a:buNone/>
       <a:tabLst/>
-      <a:defRPr b="0" baseline="0" cap="none" i="0" spc="0" strike="noStrike" sz="8600" u="none" kumimoji="0" normalizeH="0">
+      <a:defRPr kumimoji="0" sz="8600" b="0" i="0" u="none" strike="noStrike" cap="none" spc="0" normalizeH="0" baseline="0">
         <a:ln>
           <a:noFill/>
         </a:ln>
@@ -144,7 +144,7 @@
       <a:buFontTx/>
       <a:buNone/>
       <a:tabLst/>
-      <a:defRPr b="0" baseline="0" cap="none" i="0" spc="0" strike="noStrike" sz="8600" u="none" kumimoji="0" normalizeH="0">
+      <a:defRPr kumimoji="0" sz="8600" b="0" i="0" u="none" strike="noStrike" cap="none" spc="0" normalizeH="0" baseline="0">
         <a:ln>
           <a:noFill/>
         </a:ln>
@@ -174,7 +174,7 @@
       <a:buFontTx/>
       <a:buNone/>
       <a:tabLst/>
-      <a:defRPr b="0" baseline="0" cap="none" i="0" spc="0" strike="noStrike" sz="8600" u="none" kumimoji="0" normalizeH="0">
+      <a:defRPr kumimoji="0" sz="8600" b="0" i="0" u="none" strike="noStrike" cap="none" spc="0" normalizeH="0" baseline="0">
         <a:ln>
           <a:noFill/>
         </a:ln>
@@ -204,7 +204,7 @@
       <a:buFontTx/>
       <a:buNone/>
       <a:tabLst/>
-      <a:defRPr b="0" baseline="0" cap="none" i="0" spc="0" strike="noStrike" sz="8600" u="none" kumimoji="0" normalizeH="0">
+      <a:defRPr kumimoji="0" sz="8600" b="0" i="0" u="none" strike="noStrike" cap="none" spc="0" normalizeH="0" baseline="0">
         <a:ln>
           <a:noFill/>
         </a:ln>
@@ -234,7 +234,7 @@
       <a:buFontTx/>
       <a:buNone/>
       <a:tabLst/>
-      <a:defRPr b="0" baseline="0" cap="none" i="0" spc="0" strike="noStrike" sz="8600" u="none" kumimoji="0" normalizeH="0">
+      <a:defRPr kumimoji="0" sz="8600" b="0" i="0" u="none" strike="noStrike" cap="none" spc="0" normalizeH="0" baseline="0">
         <a:ln>
           <a:noFill/>
         </a:ln>
@@ -264,7 +264,7 @@
       <a:buFontTx/>
       <a:buNone/>
       <a:tabLst/>
-      <a:defRPr b="0" baseline="0" cap="none" i="0" spc="0" strike="noStrike" sz="8600" u="none" kumimoji="0" normalizeH="0">
+      <a:defRPr kumimoji="0" sz="8600" b="0" i="0" u="none" strike="noStrike" cap="none" spc="0" normalizeH="0" baseline="0">
         <a:ln>
           <a:noFill/>
         </a:ln>
@@ -294,7 +294,7 @@
       <a:buFontTx/>
       <a:buNone/>
       <a:tabLst/>
-      <a:defRPr b="0" baseline="0" cap="none" i="0" spc="0" strike="noStrike" sz="8600" u="none" kumimoji="0" normalizeH="0">
+      <a:defRPr kumimoji="0" sz="8600" b="0" i="0" u="none" strike="noStrike" cap="none" spc="0" normalizeH="0" baseline="0">
         <a:ln>
           <a:noFill/>
         </a:ln>
@@ -313,13 +313,14 @@
 </p:presentation>
 </file>
 
-<file path=ppt/commentAuthors.xml><?xml version="1.0" encoding="utf-8"?>
-<p:cmAuthorLst xmlns:a="http://schemas.openxmlformats.org/drawingml/2006/main" xmlns:r="http://schemas.openxmlformats.org/officeDocument/2006/relationships" xmlns:p="http://schemas.openxmlformats.org/presentationml/2006/main"/>
-</file>
-
 <file path=ppt/notesMasters/notesMaster1.xml><?xml version="1.0" encoding="utf-8"?>
 <p:notesMaster xmlns:a="http://schemas.openxmlformats.org/drawingml/2006/main" xmlns:r="http://schemas.openxmlformats.org/officeDocument/2006/relationships" xmlns:p="http://schemas.openxmlformats.org/presentationml/2006/main">
   <p:cSld>
+    <p:bg>
+      <p:bgRef idx="1001">
+        <a:schemeClr val="bg1"/>
+      </p:bgRef>
+    </p:bg>
     <p:spTree>
       <p:nvGrpSpPr>
         <p:cNvPr id="1" name=""/>
@@ -337,7 +338,9 @@
       <p:sp>
         <p:nvSpPr>
           <p:cNvPr id="109" name="Shape 109"/>
-          <p:cNvSpPr/>
+          <p:cNvSpPr>
+            <a:spLocks noGrp="1" noRot="1" noChangeAspect="1"/>
+          </p:cNvSpPr>
           <p:nvPr>
             <p:ph type="sldImg"/>
           </p:nvPr>
@@ -355,14 +358,16 @@
           <a:bodyPr/>
           <a:lstStyle/>
           <a:p>
-            <a:pPr/>
+            <a:endParaRPr/>
           </a:p>
         </p:txBody>
       </p:sp>
       <p:sp>
         <p:nvSpPr>
           <p:cNvPr id="110" name="Shape 110"/>
-          <p:cNvSpPr/>
+          <p:cNvSpPr>
+            <a:spLocks noGrp="1"/>
+          </p:cNvSpPr>
           <p:nvPr>
             <p:ph type="body" sz="quarter" idx="1"/>
           </p:nvPr>
@@ -380,7 +385,7 @@
           <a:bodyPr/>
           <a:lstStyle/>
           <a:p>
-            <a:pPr/>
+            <a:endParaRPr/>
           </a:p>
         </p:txBody>
       </p:sp>
@@ -465,7 +470,7 @@
 </file>
 
 <file path=ppt/slideLayouts/slideLayout1.xml><?xml version="1.0" encoding="utf-8"?>
-<p:sldLayout xmlns:a="http://schemas.openxmlformats.org/drawingml/2006/main" xmlns:r="http://schemas.openxmlformats.org/officeDocument/2006/relationships" xmlns:p="http://schemas.openxmlformats.org/presentationml/2006/main" type="title" showMasterSp="1" showMasterPhAnim="1">
+<p:sldLayout xmlns:a="http://schemas.openxmlformats.org/drawingml/2006/main" xmlns:r="http://schemas.openxmlformats.org/officeDocument/2006/relationships" xmlns:p="http://schemas.openxmlformats.org/presentationml/2006/main" type="title">
   <p:cSld name="Title Slide">
     <p:spTree>
       <p:nvGrpSpPr>
@@ -484,7 +489,9 @@
       <p:sp>
         <p:nvSpPr>
           <p:cNvPr id="11" name="Shape 11"/>
-          <p:cNvSpPr/>
+          <p:cNvSpPr>
+            <a:spLocks noGrp="1"/>
+          </p:cNvSpPr>
           <p:nvPr>
             <p:ph type="title"/>
           </p:nvPr>
@@ -502,11 +509,10 @@
           <a:bodyPr anchor="ctr"/>
           <a:lstStyle>
             <a:lvl1pPr algn="ctr">
-              <a:defRPr b="0" cap="none" sz="21100"/>
+              <a:defRPr sz="21100" b="0" cap="none"/>
             </a:lvl1pPr>
           </a:lstStyle>
           <a:p>
-            <a:pPr/>
             <a:r>
               <a:t>Title Text</a:t>
             </a:r>
@@ -516,7 +522,9 @@
       <p:sp>
         <p:nvSpPr>
           <p:cNvPr id="12" name="Shape 12"/>
-          <p:cNvSpPr/>
+          <p:cNvSpPr>
+            <a:spLocks noGrp="1"/>
+          </p:cNvSpPr>
           <p:nvPr>
             <p:ph type="body" sz="quarter" idx="1"/>
           </p:nvPr>
@@ -565,7 +573,6 @@
             </a:lvl5pPr>
           </a:lstStyle>
           <a:p>
-            <a:pPr/>
             <a:r>
               <a:t>Body Level One</a:t>
             </a:r>
@@ -599,7 +606,9 @@
       <p:sp>
         <p:nvSpPr>
           <p:cNvPr id="13" name="Shape 13"/>
-          <p:cNvSpPr/>
+          <p:cNvSpPr>
+            <a:spLocks noGrp="1"/>
+          </p:cNvSpPr>
           <p:nvPr>
             <p:ph type="sldNum" sz="quarter" idx="2"/>
           </p:nvPr>
@@ -613,8 +622,10 @@
           <a:bodyPr/>
           <a:lstStyle/>
           <a:p>
-            <a:pPr/>
-            <a:fld id="{86CB4B4D-7CA3-9044-876B-883B54F8677D}" type="slidenum"/>
+            <a:fld id="{86CB4B4D-7CA3-9044-876B-883B54F8677D}" type="slidenum">
+              <a:t>‹#›</a:t>
+            </a:fld>
+            <a:endParaRPr/>
           </a:p>
         </p:txBody>
       </p:sp>
@@ -623,12 +634,12 @@
   <p:clrMapOvr>
     <a:masterClrMapping/>
   </p:clrMapOvr>
-  <p:transition xmlns:p14="http://schemas.microsoft.com/office/powerpoint/2010/main" spd="med" advClick="1"/>
+  <p:transition spd="med"/>
 </p:sldLayout>
 </file>
 
 <file path=ppt/slideLayouts/slideLayout10.xml><?xml version="1.0" encoding="utf-8"?>
-<p:sldLayout xmlns:a="http://schemas.openxmlformats.org/drawingml/2006/main" xmlns:r="http://schemas.openxmlformats.org/officeDocument/2006/relationships" xmlns:p="http://schemas.openxmlformats.org/presentationml/2006/main" type="tx" showMasterSp="1" showMasterPhAnim="1">
+<p:sldLayout xmlns:a="http://schemas.openxmlformats.org/drawingml/2006/main" xmlns:r="http://schemas.openxmlformats.org/officeDocument/2006/relationships" xmlns:p="http://schemas.openxmlformats.org/presentationml/2006/main" type="tx">
   <p:cSld name="Title and Vertical Text">
     <p:spTree>
       <p:nvGrpSpPr>
@@ -647,7 +658,9 @@
       <p:sp>
         <p:nvSpPr>
           <p:cNvPr id="92" name="Shape 92"/>
-          <p:cNvSpPr/>
+          <p:cNvSpPr>
+            <a:spLocks noGrp="1"/>
+          </p:cNvSpPr>
           <p:nvPr>
             <p:ph type="title"/>
           </p:nvPr>
@@ -665,11 +678,10 @@
           <a:bodyPr anchor="ctr"/>
           <a:lstStyle>
             <a:lvl1pPr algn="ctr">
-              <a:defRPr b="0" cap="none" sz="21100"/>
+              <a:defRPr sz="21100" b="0" cap="none"/>
             </a:lvl1pPr>
           </a:lstStyle>
           <a:p>
-            <a:pPr/>
             <a:r>
               <a:t>Title Text</a:t>
             </a:r>
@@ -679,7 +691,9 @@
       <p:sp>
         <p:nvSpPr>
           <p:cNvPr id="93" name="Shape 93"/>
-          <p:cNvSpPr/>
+          <p:cNvSpPr>
+            <a:spLocks noGrp="1"/>
+          </p:cNvSpPr>
           <p:nvPr>
             <p:ph type="body" idx="1"/>
           </p:nvPr>
@@ -763,7 +777,6 @@
             </a:lvl5pPr>
           </a:lstStyle>
           <a:p>
-            <a:pPr/>
             <a:r>
               <a:t>Body Level One</a:t>
             </a:r>
@@ -797,7 +810,9 @@
       <p:sp>
         <p:nvSpPr>
           <p:cNvPr id="94" name="Shape 94"/>
-          <p:cNvSpPr/>
+          <p:cNvSpPr>
+            <a:spLocks noGrp="1"/>
+          </p:cNvSpPr>
           <p:nvPr>
             <p:ph type="sldNum" sz="quarter" idx="2"/>
           </p:nvPr>
@@ -811,8 +826,10 @@
           <a:bodyPr/>
           <a:lstStyle/>
           <a:p>
-            <a:pPr/>
-            <a:fld id="{86CB4B4D-7CA3-9044-876B-883B54F8677D}" type="slidenum"/>
+            <a:fld id="{86CB4B4D-7CA3-9044-876B-883B54F8677D}" type="slidenum">
+              <a:t>‹#›</a:t>
+            </a:fld>
+            <a:endParaRPr/>
           </a:p>
         </p:txBody>
       </p:sp>
@@ -821,12 +838,12 @@
   <p:clrMapOvr>
     <a:masterClrMapping/>
   </p:clrMapOvr>
-  <p:transition xmlns:p14="http://schemas.microsoft.com/office/powerpoint/2010/main" spd="med" advClick="1"/>
+  <p:transition spd="med"/>
 </p:sldLayout>
 </file>
 
 <file path=ppt/slideLayouts/slideLayout11.xml><?xml version="1.0" encoding="utf-8"?>
-<p:sldLayout xmlns:a="http://schemas.openxmlformats.org/drawingml/2006/main" xmlns:r="http://schemas.openxmlformats.org/officeDocument/2006/relationships" xmlns:p="http://schemas.openxmlformats.org/presentationml/2006/main" type="tx" showMasterSp="1" showMasterPhAnim="1">
+<p:sldLayout xmlns:a="http://schemas.openxmlformats.org/drawingml/2006/main" xmlns:r="http://schemas.openxmlformats.org/officeDocument/2006/relationships" xmlns:p="http://schemas.openxmlformats.org/presentationml/2006/main" type="tx">
   <p:cSld name="Vertical Title and Text">
     <p:spTree>
       <p:nvGrpSpPr>
@@ -845,7 +862,9 @@
       <p:sp>
         <p:nvSpPr>
           <p:cNvPr id="101" name="Shape 101"/>
-          <p:cNvSpPr/>
+          <p:cNvSpPr>
+            <a:spLocks noGrp="1"/>
+          </p:cNvSpPr>
           <p:nvPr>
             <p:ph type="title"/>
           </p:nvPr>
@@ -863,11 +882,10 @@
           <a:bodyPr anchor="ctr"/>
           <a:lstStyle>
             <a:lvl1pPr algn="ctr">
-              <a:defRPr b="0" cap="none" sz="21100"/>
+              <a:defRPr sz="21100" b="0" cap="none"/>
             </a:lvl1pPr>
           </a:lstStyle>
           <a:p>
-            <a:pPr/>
             <a:r>
               <a:t>Title Text</a:t>
             </a:r>
@@ -877,7 +895,9 @@
       <p:sp>
         <p:nvSpPr>
           <p:cNvPr id="102" name="Shape 102"/>
-          <p:cNvSpPr/>
+          <p:cNvSpPr>
+            <a:spLocks noGrp="1"/>
+          </p:cNvSpPr>
           <p:nvPr>
             <p:ph type="body" idx="1"/>
           </p:nvPr>
@@ -961,7 +981,6 @@
             </a:lvl5pPr>
           </a:lstStyle>
           <a:p>
-            <a:pPr/>
             <a:r>
               <a:t>Body Level One</a:t>
             </a:r>
@@ -995,7 +1014,9 @@
       <p:sp>
         <p:nvSpPr>
           <p:cNvPr id="103" name="Shape 103"/>
-          <p:cNvSpPr/>
+          <p:cNvSpPr>
+            <a:spLocks noGrp="1"/>
+          </p:cNvSpPr>
           <p:nvPr>
             <p:ph type="sldNum" sz="quarter" idx="2"/>
           </p:nvPr>
@@ -1009,8 +1030,10 @@
           <a:bodyPr/>
           <a:lstStyle/>
           <a:p>
-            <a:pPr/>
-            <a:fld id="{86CB4B4D-7CA3-9044-876B-883B54F8677D}" type="slidenum"/>
+            <a:fld id="{86CB4B4D-7CA3-9044-876B-883B54F8677D}" type="slidenum">
+              <a:t>‹#›</a:t>
+            </a:fld>
+            <a:endParaRPr/>
           </a:p>
         </p:txBody>
       </p:sp>
@@ -1019,12 +1042,12 @@
   <p:clrMapOvr>
     <a:masterClrMapping/>
   </p:clrMapOvr>
-  <p:transition xmlns:p14="http://schemas.microsoft.com/office/powerpoint/2010/main" spd="med" advClick="1"/>
+  <p:transition spd="med"/>
 </p:sldLayout>
 </file>
 
 <file path=ppt/slideLayouts/slideLayout2.xml><?xml version="1.0" encoding="utf-8"?>
-<p:sldLayout xmlns:a="http://schemas.openxmlformats.org/drawingml/2006/main" xmlns:r="http://schemas.openxmlformats.org/officeDocument/2006/relationships" xmlns:p="http://schemas.openxmlformats.org/presentationml/2006/main" type="tx" showMasterSp="1" showMasterPhAnim="1">
+<p:sldLayout xmlns:a="http://schemas.openxmlformats.org/drawingml/2006/main" xmlns:r="http://schemas.openxmlformats.org/officeDocument/2006/relationships" xmlns:p="http://schemas.openxmlformats.org/presentationml/2006/main" type="tx">
   <p:cSld name="Title and Content">
     <p:spTree>
       <p:nvGrpSpPr>
@@ -1043,7 +1066,9 @@
       <p:sp>
         <p:nvSpPr>
           <p:cNvPr id="20" name="Shape 20"/>
-          <p:cNvSpPr/>
+          <p:cNvSpPr>
+            <a:spLocks noGrp="1"/>
+          </p:cNvSpPr>
           <p:nvPr>
             <p:ph type="title"/>
           </p:nvPr>
@@ -1061,11 +1086,10 @@
           <a:bodyPr anchor="ctr"/>
           <a:lstStyle>
             <a:lvl1pPr algn="ctr">
-              <a:defRPr b="0" cap="none" sz="21100"/>
+              <a:defRPr sz="21100" b="0" cap="none"/>
             </a:lvl1pPr>
           </a:lstStyle>
           <a:p>
-            <a:pPr/>
             <a:r>
               <a:t>Title Text</a:t>
             </a:r>
@@ -1075,7 +1099,9 @@
       <p:sp>
         <p:nvSpPr>
           <p:cNvPr id="21" name="Shape 21"/>
-          <p:cNvSpPr/>
+          <p:cNvSpPr>
+            <a:spLocks noGrp="1"/>
+          </p:cNvSpPr>
           <p:nvPr>
             <p:ph type="body" idx="1"/>
           </p:nvPr>
@@ -1159,7 +1185,6 @@
             </a:lvl5pPr>
           </a:lstStyle>
           <a:p>
-            <a:pPr/>
             <a:r>
               <a:t>Body Level One</a:t>
             </a:r>
@@ -1193,7 +1218,9 @@
       <p:sp>
         <p:nvSpPr>
           <p:cNvPr id="22" name="Shape 22"/>
-          <p:cNvSpPr/>
+          <p:cNvSpPr>
+            <a:spLocks noGrp="1"/>
+          </p:cNvSpPr>
           <p:nvPr>
             <p:ph type="sldNum" sz="quarter" idx="2"/>
           </p:nvPr>
@@ -1207,8 +1234,10 @@
           <a:bodyPr/>
           <a:lstStyle/>
           <a:p>
-            <a:pPr/>
-            <a:fld id="{86CB4B4D-7CA3-9044-876B-883B54F8677D}" type="slidenum"/>
+            <a:fld id="{86CB4B4D-7CA3-9044-876B-883B54F8677D}" type="slidenum">
+              <a:t>‹#›</a:t>
+            </a:fld>
+            <a:endParaRPr/>
           </a:p>
         </p:txBody>
       </p:sp>
@@ -1217,12 +1246,12 @@
   <p:clrMapOvr>
     <a:masterClrMapping/>
   </p:clrMapOvr>
-  <p:transition xmlns:p14="http://schemas.microsoft.com/office/powerpoint/2010/main" spd="med" advClick="1"/>
+  <p:transition spd="med"/>
 </p:sldLayout>
 </file>
 
 <file path=ppt/slideLayouts/slideLayout3.xml><?xml version="1.0" encoding="utf-8"?>
-<p:sldLayout xmlns:a="http://schemas.openxmlformats.org/drawingml/2006/main" xmlns:r="http://schemas.openxmlformats.org/officeDocument/2006/relationships" xmlns:p="http://schemas.openxmlformats.org/presentationml/2006/main" type="tx" showMasterSp="1" showMasterPhAnim="1">
+<p:sldLayout xmlns:a="http://schemas.openxmlformats.org/drawingml/2006/main" xmlns:r="http://schemas.openxmlformats.org/officeDocument/2006/relationships" xmlns:p="http://schemas.openxmlformats.org/presentationml/2006/main" type="tx">
   <p:cSld name="Section Header">
     <p:spTree>
       <p:nvGrpSpPr>
@@ -1241,7 +1270,9 @@
       <p:sp>
         <p:nvSpPr>
           <p:cNvPr id="29" name="Shape 29"/>
-          <p:cNvSpPr/>
+          <p:cNvSpPr>
+            <a:spLocks noGrp="1"/>
+          </p:cNvSpPr>
           <p:nvPr>
             <p:ph type="title"/>
           </p:nvPr>
@@ -1255,7 +1286,6 @@
           <a:bodyPr/>
           <a:lstStyle/>
           <a:p>
-            <a:pPr/>
             <a:r>
               <a:t>Title Text</a:t>
             </a:r>
@@ -1265,7 +1295,9 @@
       <p:sp>
         <p:nvSpPr>
           <p:cNvPr id="30" name="Shape 30"/>
-          <p:cNvSpPr/>
+          <p:cNvSpPr>
+            <a:spLocks noGrp="1"/>
+          </p:cNvSpPr>
           <p:nvPr>
             <p:ph type="body" sz="quarter" idx="1"/>
           </p:nvPr>
@@ -1279,7 +1311,6 @@
           <a:bodyPr/>
           <a:lstStyle/>
           <a:p>
-            <a:pPr/>
             <a:r>
               <a:t>Body Level One</a:t>
             </a:r>
@@ -1313,7 +1344,9 @@
       <p:sp>
         <p:nvSpPr>
           <p:cNvPr id="31" name="Shape 31"/>
-          <p:cNvSpPr/>
+          <p:cNvSpPr>
+            <a:spLocks noGrp="1"/>
+          </p:cNvSpPr>
           <p:nvPr>
             <p:ph type="sldNum" sz="quarter" idx="2"/>
           </p:nvPr>
@@ -1327,8 +1360,10 @@
           <a:bodyPr/>
           <a:lstStyle/>
           <a:p>
-            <a:pPr/>
-            <a:fld id="{86CB4B4D-7CA3-9044-876B-883B54F8677D}" type="slidenum"/>
+            <a:fld id="{86CB4B4D-7CA3-9044-876B-883B54F8677D}" type="slidenum">
+              <a:t>‹#›</a:t>
+            </a:fld>
+            <a:endParaRPr/>
           </a:p>
         </p:txBody>
       </p:sp>
@@ -1337,12 +1372,12 @@
   <p:clrMapOvr>
     <a:masterClrMapping/>
   </p:clrMapOvr>
-  <p:transition xmlns:p14="http://schemas.microsoft.com/office/powerpoint/2010/main" spd="med" advClick="1"/>
+  <p:transition spd="med"/>
 </p:sldLayout>
 </file>
 
 <file path=ppt/slideLayouts/slideLayout4.xml><?xml version="1.0" encoding="utf-8"?>
-<p:sldLayout xmlns:a="http://schemas.openxmlformats.org/drawingml/2006/main" xmlns:r="http://schemas.openxmlformats.org/officeDocument/2006/relationships" xmlns:p="http://schemas.openxmlformats.org/presentationml/2006/main" type="tx" showMasterSp="1" showMasterPhAnim="1">
+<p:sldLayout xmlns:a="http://schemas.openxmlformats.org/drawingml/2006/main" xmlns:r="http://schemas.openxmlformats.org/officeDocument/2006/relationships" xmlns:p="http://schemas.openxmlformats.org/presentationml/2006/main" type="tx">
   <p:cSld name="Two Content">
     <p:spTree>
       <p:nvGrpSpPr>
@@ -1361,7 +1396,9 @@
       <p:sp>
         <p:nvSpPr>
           <p:cNvPr id="38" name="Shape 38"/>
-          <p:cNvSpPr/>
+          <p:cNvSpPr>
+            <a:spLocks noGrp="1"/>
+          </p:cNvSpPr>
           <p:nvPr>
             <p:ph type="title"/>
           </p:nvPr>
@@ -1379,11 +1416,10 @@
           <a:bodyPr anchor="ctr"/>
           <a:lstStyle>
             <a:lvl1pPr algn="ctr">
-              <a:defRPr b="0" cap="none" sz="21100"/>
+              <a:defRPr sz="21100" b="0" cap="none"/>
             </a:lvl1pPr>
           </a:lstStyle>
           <a:p>
-            <a:pPr/>
             <a:r>
               <a:t>Title Text</a:t>
             </a:r>
@@ -1393,7 +1429,9 @@
       <p:sp>
         <p:nvSpPr>
           <p:cNvPr id="39" name="Shape 39"/>
-          <p:cNvSpPr/>
+          <p:cNvSpPr>
+            <a:spLocks noGrp="1"/>
+          </p:cNvSpPr>
           <p:nvPr>
             <p:ph type="body" sz="half" idx="1"/>
           </p:nvPr>
@@ -1477,7 +1515,6 @@
             </a:lvl5pPr>
           </a:lstStyle>
           <a:p>
-            <a:pPr/>
             <a:r>
               <a:t>Body Level One</a:t>
             </a:r>
@@ -1511,7 +1548,9 @@
       <p:sp>
         <p:nvSpPr>
           <p:cNvPr id="40" name="Shape 40"/>
-          <p:cNvSpPr/>
+          <p:cNvSpPr>
+            <a:spLocks noGrp="1"/>
+          </p:cNvSpPr>
           <p:nvPr>
             <p:ph type="sldNum" sz="quarter" idx="2"/>
           </p:nvPr>
@@ -1525,8 +1564,10 @@
           <a:bodyPr/>
           <a:lstStyle/>
           <a:p>
-            <a:pPr/>
-            <a:fld id="{86CB4B4D-7CA3-9044-876B-883B54F8677D}" type="slidenum"/>
+            <a:fld id="{86CB4B4D-7CA3-9044-876B-883B54F8677D}" type="slidenum">
+              <a:t>‹#›</a:t>
+            </a:fld>
+            <a:endParaRPr/>
           </a:p>
         </p:txBody>
       </p:sp>
@@ -1535,12 +1576,12 @@
   <p:clrMapOvr>
     <a:masterClrMapping/>
   </p:clrMapOvr>
-  <p:transition xmlns:p14="http://schemas.microsoft.com/office/powerpoint/2010/main" spd="med" advClick="1"/>
+  <p:transition spd="med"/>
 </p:sldLayout>
 </file>
 
 <file path=ppt/slideLayouts/slideLayout5.xml><?xml version="1.0" encoding="utf-8"?>
-<p:sldLayout xmlns:a="http://schemas.openxmlformats.org/drawingml/2006/main" xmlns:r="http://schemas.openxmlformats.org/officeDocument/2006/relationships" xmlns:p="http://schemas.openxmlformats.org/presentationml/2006/main" type="tx" showMasterSp="1" showMasterPhAnim="1">
+<p:sldLayout xmlns:a="http://schemas.openxmlformats.org/drawingml/2006/main" xmlns:r="http://schemas.openxmlformats.org/officeDocument/2006/relationships" xmlns:p="http://schemas.openxmlformats.org/presentationml/2006/main" type="tx">
   <p:cSld name="Comparison">
     <p:spTree>
       <p:nvGrpSpPr>
@@ -1559,7 +1600,9 @@
       <p:sp>
         <p:nvSpPr>
           <p:cNvPr id="47" name="Shape 47"/>
-          <p:cNvSpPr/>
+          <p:cNvSpPr>
+            <a:spLocks noGrp="1"/>
+          </p:cNvSpPr>
           <p:nvPr>
             <p:ph type="title"/>
           </p:nvPr>
@@ -1577,11 +1620,10 @@
           <a:bodyPr anchor="ctr"/>
           <a:lstStyle>
             <a:lvl1pPr algn="ctr">
-              <a:defRPr b="0" cap="none" sz="21100"/>
+              <a:defRPr sz="21100" b="0" cap="none"/>
             </a:lvl1pPr>
           </a:lstStyle>
           <a:p>
-            <a:pPr/>
             <a:r>
               <a:t>Title Text</a:t>
             </a:r>
@@ -1591,7 +1633,9 @@
       <p:sp>
         <p:nvSpPr>
           <p:cNvPr id="48" name="Shape 48"/>
-          <p:cNvSpPr/>
+          <p:cNvSpPr>
+            <a:spLocks noGrp="1"/>
+          </p:cNvSpPr>
           <p:nvPr>
             <p:ph type="body" sz="quarter" idx="1"/>
           </p:nvPr>
@@ -1612,7 +1656,7 @@
               <a:spcBef>
                 <a:spcPts val="2700"/>
               </a:spcBef>
-              <a:defRPr b="1" sz="11500">
+              <a:defRPr sz="11500" b="1">
                 <a:solidFill>
                   <a:srgbClr val="000000"/>
                 </a:solidFill>
@@ -1622,7 +1666,7 @@
               <a:spcBef>
                 <a:spcPts val="2700"/>
               </a:spcBef>
-              <a:defRPr b="1" sz="11500">
+              <a:defRPr sz="11500" b="1">
                 <a:solidFill>
                   <a:srgbClr val="000000"/>
                 </a:solidFill>
@@ -1632,7 +1676,7 @@
               <a:spcBef>
                 <a:spcPts val="2700"/>
               </a:spcBef>
-              <a:defRPr b="1" sz="11500">
+              <a:defRPr sz="11500" b="1">
                 <a:solidFill>
                   <a:srgbClr val="000000"/>
                 </a:solidFill>
@@ -1642,7 +1686,7 @@
               <a:spcBef>
                 <a:spcPts val="2700"/>
               </a:spcBef>
-              <a:defRPr b="1" sz="11500">
+              <a:defRPr sz="11500" b="1">
                 <a:solidFill>
                   <a:srgbClr val="000000"/>
                 </a:solidFill>
@@ -1652,7 +1696,7 @@
               <a:spcBef>
                 <a:spcPts val="2700"/>
               </a:spcBef>
-              <a:defRPr b="1" sz="11500">
+              <a:defRPr sz="11500" b="1">
                 <a:solidFill>
                   <a:srgbClr val="000000"/>
                 </a:solidFill>
@@ -1660,7 +1704,6 @@
             </a:lvl5pPr>
           </a:lstStyle>
           <a:p>
-            <a:pPr/>
             <a:r>
               <a:t>Body Level One</a:t>
             </a:r>
@@ -1694,7 +1737,9 @@
       <p:sp>
         <p:nvSpPr>
           <p:cNvPr id="49" name="Shape 49"/>
-          <p:cNvSpPr/>
+          <p:cNvSpPr>
+            <a:spLocks noGrp="1"/>
+          </p:cNvSpPr>
           <p:nvPr>
             <p:ph type="body" sz="quarter" idx="13"/>
           </p:nvPr>
@@ -1712,14 +1757,16 @@
           <a:bodyPr/>
           <a:lstStyle/>
           <a:p>
-            <a:pPr/>
+            <a:endParaRPr/>
           </a:p>
         </p:txBody>
       </p:sp>
       <p:sp>
         <p:nvSpPr>
           <p:cNvPr id="50" name="Shape 50"/>
-          <p:cNvSpPr/>
+          <p:cNvSpPr>
+            <a:spLocks noGrp="1"/>
+          </p:cNvSpPr>
           <p:nvPr>
             <p:ph type="sldNum" sz="quarter" idx="2"/>
           </p:nvPr>
@@ -1733,8 +1780,10 @@
           <a:bodyPr/>
           <a:lstStyle/>
           <a:p>
-            <a:pPr/>
-            <a:fld id="{86CB4B4D-7CA3-9044-876B-883B54F8677D}" type="slidenum"/>
+            <a:fld id="{86CB4B4D-7CA3-9044-876B-883B54F8677D}" type="slidenum">
+              <a:t>‹#›</a:t>
+            </a:fld>
+            <a:endParaRPr/>
           </a:p>
         </p:txBody>
       </p:sp>
@@ -1743,12 +1792,12 @@
   <p:clrMapOvr>
     <a:masterClrMapping/>
   </p:clrMapOvr>
-  <p:transition xmlns:p14="http://schemas.microsoft.com/office/powerpoint/2010/main" spd="med" advClick="1"/>
+  <p:transition spd="med"/>
 </p:sldLayout>
 </file>
 
 <file path=ppt/slideLayouts/slideLayout6.xml><?xml version="1.0" encoding="utf-8"?>
-<p:sldLayout xmlns:a="http://schemas.openxmlformats.org/drawingml/2006/main" xmlns:r="http://schemas.openxmlformats.org/officeDocument/2006/relationships" xmlns:p="http://schemas.openxmlformats.org/presentationml/2006/main" type="tx" showMasterSp="1" showMasterPhAnim="1">
+<p:sldLayout xmlns:a="http://schemas.openxmlformats.org/drawingml/2006/main" xmlns:r="http://schemas.openxmlformats.org/officeDocument/2006/relationships" xmlns:p="http://schemas.openxmlformats.org/presentationml/2006/main" type="tx">
   <p:cSld name="Title Only">
     <p:spTree>
       <p:nvGrpSpPr>
@@ -1767,7 +1816,9 @@
       <p:sp>
         <p:nvSpPr>
           <p:cNvPr id="57" name="Shape 57"/>
-          <p:cNvSpPr/>
+          <p:cNvSpPr>
+            <a:spLocks noGrp="1"/>
+          </p:cNvSpPr>
           <p:nvPr>
             <p:ph type="title"/>
           </p:nvPr>
@@ -1785,11 +1836,10 @@
           <a:bodyPr anchor="ctr"/>
           <a:lstStyle>
             <a:lvl1pPr algn="ctr">
-              <a:defRPr b="0" cap="none" sz="21100"/>
+              <a:defRPr sz="21100" b="0" cap="none"/>
             </a:lvl1pPr>
           </a:lstStyle>
           <a:p>
-            <a:pPr/>
             <a:r>
               <a:t>Title Text</a:t>
             </a:r>
@@ -1799,7 +1849,9 @@
       <p:sp>
         <p:nvSpPr>
           <p:cNvPr id="58" name="Shape 58"/>
-          <p:cNvSpPr/>
+          <p:cNvSpPr>
+            <a:spLocks noGrp="1"/>
+          </p:cNvSpPr>
           <p:nvPr>
             <p:ph type="sldNum" sz="quarter" idx="2"/>
           </p:nvPr>
@@ -1813,8 +1865,10 @@
           <a:bodyPr/>
           <a:lstStyle/>
           <a:p>
-            <a:pPr/>
-            <a:fld id="{86CB4B4D-7CA3-9044-876B-883B54F8677D}" type="slidenum"/>
+            <a:fld id="{86CB4B4D-7CA3-9044-876B-883B54F8677D}" type="slidenum">
+              <a:t>‹#›</a:t>
+            </a:fld>
+            <a:endParaRPr/>
           </a:p>
         </p:txBody>
       </p:sp>
@@ -1823,12 +1877,12 @@
   <p:clrMapOvr>
     <a:masterClrMapping/>
   </p:clrMapOvr>
-  <p:transition xmlns:p14="http://schemas.microsoft.com/office/powerpoint/2010/main" spd="med" advClick="1"/>
+  <p:transition spd="med"/>
 </p:sldLayout>
 </file>
 
 <file path=ppt/slideLayouts/slideLayout7.xml><?xml version="1.0" encoding="utf-8"?>
-<p:sldLayout xmlns:a="http://schemas.openxmlformats.org/drawingml/2006/main" xmlns:r="http://schemas.openxmlformats.org/officeDocument/2006/relationships" xmlns:p="http://schemas.openxmlformats.org/presentationml/2006/main" type="tx" showMasterSp="1" showMasterPhAnim="1">
+<p:sldLayout xmlns:a="http://schemas.openxmlformats.org/drawingml/2006/main" xmlns:r="http://schemas.openxmlformats.org/officeDocument/2006/relationships" xmlns:p="http://schemas.openxmlformats.org/presentationml/2006/main" type="tx">
   <p:cSld name="Blank">
     <p:spTree>
       <p:nvGrpSpPr>
@@ -1847,7 +1901,9 @@
       <p:sp>
         <p:nvSpPr>
           <p:cNvPr id="65" name="Shape 65"/>
-          <p:cNvSpPr/>
+          <p:cNvSpPr>
+            <a:spLocks noGrp="1"/>
+          </p:cNvSpPr>
           <p:nvPr>
             <p:ph type="sldNum" sz="quarter" idx="2"/>
           </p:nvPr>
@@ -1861,8 +1917,10 @@
           <a:bodyPr/>
           <a:lstStyle/>
           <a:p>
-            <a:pPr/>
-            <a:fld id="{86CB4B4D-7CA3-9044-876B-883B54F8677D}" type="slidenum"/>
+            <a:fld id="{86CB4B4D-7CA3-9044-876B-883B54F8677D}" type="slidenum">
+              <a:t>‹#›</a:t>
+            </a:fld>
+            <a:endParaRPr/>
           </a:p>
         </p:txBody>
       </p:sp>
@@ -1871,12 +1929,12 @@
   <p:clrMapOvr>
     <a:masterClrMapping/>
   </p:clrMapOvr>
-  <p:transition xmlns:p14="http://schemas.microsoft.com/office/powerpoint/2010/main" spd="med" advClick="1"/>
+  <p:transition spd="med"/>
 </p:sldLayout>
 </file>
 
 <file path=ppt/slideLayouts/slideLayout8.xml><?xml version="1.0" encoding="utf-8"?>
-<p:sldLayout xmlns:a="http://schemas.openxmlformats.org/drawingml/2006/main" xmlns:r="http://schemas.openxmlformats.org/officeDocument/2006/relationships" xmlns:p="http://schemas.openxmlformats.org/presentationml/2006/main" type="tx" showMasterSp="1" showMasterPhAnim="1">
+<p:sldLayout xmlns:a="http://schemas.openxmlformats.org/drawingml/2006/main" xmlns:r="http://schemas.openxmlformats.org/officeDocument/2006/relationships" xmlns:p="http://schemas.openxmlformats.org/presentationml/2006/main" type="tx">
   <p:cSld name="Content with Caption">
     <p:spTree>
       <p:nvGrpSpPr>
@@ -1895,7 +1953,9 @@
       <p:sp>
         <p:nvSpPr>
           <p:cNvPr id="72" name="Shape 72"/>
-          <p:cNvSpPr/>
+          <p:cNvSpPr>
+            <a:spLocks noGrp="1"/>
+          </p:cNvSpPr>
           <p:nvPr>
             <p:ph type="title"/>
           </p:nvPr>
@@ -1913,11 +1973,10 @@
           <a:bodyPr anchor="b"/>
           <a:lstStyle>
             <a:lvl1pPr>
-              <a:defRPr cap="none" sz="9600"/>
+              <a:defRPr sz="9600" cap="none"/>
             </a:lvl1pPr>
           </a:lstStyle>
           <a:p>
-            <a:pPr/>
             <a:r>
               <a:t>Title Text</a:t>
             </a:r>
@@ -1927,7 +1986,9 @@
       <p:sp>
         <p:nvSpPr>
           <p:cNvPr id="73" name="Shape 73"/>
-          <p:cNvSpPr/>
+          <p:cNvSpPr>
+            <a:spLocks noGrp="1"/>
+          </p:cNvSpPr>
           <p:nvPr>
             <p:ph type="body" idx="1"/>
           </p:nvPr>
@@ -2011,7 +2072,6 @@
             </a:lvl5pPr>
           </a:lstStyle>
           <a:p>
-            <a:pPr/>
             <a:r>
               <a:t>Body Level One</a:t>
             </a:r>
@@ -2045,7 +2105,9 @@
       <p:sp>
         <p:nvSpPr>
           <p:cNvPr id="74" name="Shape 74"/>
-          <p:cNvSpPr/>
+          <p:cNvSpPr>
+            <a:spLocks noGrp="1"/>
+          </p:cNvSpPr>
           <p:nvPr>
             <p:ph type="body" sz="half" idx="13"/>
           </p:nvPr>
@@ -2063,14 +2125,16 @@
           <a:bodyPr anchor="t"/>
           <a:lstStyle/>
           <a:p>
-            <a:pPr/>
+            <a:endParaRPr/>
           </a:p>
         </p:txBody>
       </p:sp>
       <p:sp>
         <p:nvSpPr>
           <p:cNvPr id="75" name="Shape 75"/>
-          <p:cNvSpPr/>
+          <p:cNvSpPr>
+            <a:spLocks noGrp="1"/>
+          </p:cNvSpPr>
           <p:nvPr>
             <p:ph type="sldNum" sz="quarter" idx="2"/>
           </p:nvPr>
@@ -2084,8 +2148,10 @@
           <a:bodyPr/>
           <a:lstStyle/>
           <a:p>
-            <a:pPr/>
-            <a:fld id="{86CB4B4D-7CA3-9044-876B-883B54F8677D}" type="slidenum"/>
+            <a:fld id="{86CB4B4D-7CA3-9044-876B-883B54F8677D}" type="slidenum">
+              <a:t>‹#›</a:t>
+            </a:fld>
+            <a:endParaRPr/>
           </a:p>
         </p:txBody>
       </p:sp>
@@ -2094,12 +2160,12 @@
   <p:clrMapOvr>
     <a:masterClrMapping/>
   </p:clrMapOvr>
-  <p:transition xmlns:p14="http://schemas.microsoft.com/office/powerpoint/2010/main" spd="med" advClick="1"/>
+  <p:transition spd="med"/>
 </p:sldLayout>
 </file>
 
 <file path=ppt/slideLayouts/slideLayout9.xml><?xml version="1.0" encoding="utf-8"?>
-<p:sldLayout xmlns:a="http://schemas.openxmlformats.org/drawingml/2006/main" xmlns:r="http://schemas.openxmlformats.org/officeDocument/2006/relationships" xmlns:p="http://schemas.openxmlformats.org/presentationml/2006/main" type="tx" showMasterSp="1" showMasterPhAnim="1">
+<p:sldLayout xmlns:a="http://schemas.openxmlformats.org/drawingml/2006/main" xmlns:r="http://schemas.openxmlformats.org/officeDocument/2006/relationships" xmlns:p="http://schemas.openxmlformats.org/presentationml/2006/main" type="tx">
   <p:cSld name="Picture with Caption">
     <p:spTree>
       <p:nvGrpSpPr>
@@ -2118,7 +2184,9 @@
       <p:sp>
         <p:nvSpPr>
           <p:cNvPr id="82" name="Shape 82"/>
-          <p:cNvSpPr/>
+          <p:cNvSpPr>
+            <a:spLocks noGrp="1"/>
+          </p:cNvSpPr>
           <p:nvPr>
             <p:ph type="title"/>
           </p:nvPr>
@@ -2136,11 +2204,10 @@
           <a:bodyPr anchor="b"/>
           <a:lstStyle>
             <a:lvl1pPr>
-              <a:defRPr cap="none" sz="9600"/>
+              <a:defRPr sz="9600" cap="none"/>
             </a:lvl1pPr>
           </a:lstStyle>
           <a:p>
-            <a:pPr/>
             <a:r>
               <a:t>Title Text</a:t>
             </a:r>
@@ -2150,7 +2217,9 @@
       <p:sp>
         <p:nvSpPr>
           <p:cNvPr id="83" name="Shape 83"/>
-          <p:cNvSpPr/>
+          <p:cNvSpPr>
+            <a:spLocks noGrp="1"/>
+          </p:cNvSpPr>
           <p:nvPr>
             <p:ph type="pic" sz="half" idx="13"/>
           </p:nvPr>
@@ -2170,14 +2239,16 @@
           </a:bodyPr>
           <a:lstStyle/>
           <a:p>
-            <a:pPr/>
+            <a:endParaRPr/>
           </a:p>
         </p:txBody>
       </p:sp>
       <p:sp>
         <p:nvSpPr>
           <p:cNvPr id="84" name="Shape 84"/>
-          <p:cNvSpPr/>
+          <p:cNvSpPr>
+            <a:spLocks noGrp="1"/>
+          </p:cNvSpPr>
           <p:nvPr>
             <p:ph type="body" sz="quarter" idx="1"/>
           </p:nvPr>
@@ -2246,7 +2317,6 @@
             </a:lvl5pPr>
           </a:lstStyle>
           <a:p>
-            <a:pPr/>
             <a:r>
               <a:t>Body Level One</a:t>
             </a:r>
@@ -2280,7 +2350,9 @@
       <p:sp>
         <p:nvSpPr>
           <p:cNvPr id="85" name="Shape 85"/>
-          <p:cNvSpPr/>
+          <p:cNvSpPr>
+            <a:spLocks noGrp="1"/>
+          </p:cNvSpPr>
           <p:nvPr>
             <p:ph type="sldNum" sz="quarter" idx="2"/>
           </p:nvPr>
@@ -2294,8 +2366,10 @@
           <a:bodyPr/>
           <a:lstStyle/>
           <a:p>
-            <a:pPr/>
-            <a:fld id="{86CB4B4D-7CA3-9044-876B-883B54F8677D}" type="slidenum"/>
+            <a:fld id="{86CB4B4D-7CA3-9044-876B-883B54F8677D}" type="slidenum">
+              <a:t>‹#›</a:t>
+            </a:fld>
+            <a:endParaRPr/>
           </a:p>
         </p:txBody>
       </p:sp>
@@ -2304,7 +2378,7 @@
   <p:clrMapOvr>
     <a:masterClrMapping/>
   </p:clrMapOvr>
-  <p:transition xmlns:p14="http://schemas.microsoft.com/office/powerpoint/2010/main" spd="med" advClick="1"/>
+  <p:transition spd="med"/>
 </p:sldLayout>
 </file>
 
@@ -2316,6 +2390,7 @@
         <a:solidFill>
           <a:srgbClr val="FFFFFF"/>
         </a:solidFill>
+        <a:effectLst/>
       </p:bgPr>
     </p:bg>
     <p:spTree>
@@ -2335,7 +2410,9 @@
       <p:sp>
         <p:nvSpPr>
           <p:cNvPr id="2" name="Shape 2"/>
-          <p:cNvSpPr/>
+          <p:cNvSpPr>
+            <a:spLocks noGrp="1"/>
+          </p:cNvSpPr>
           <p:nvPr>
             <p:ph type="title"/>
           </p:nvPr>
@@ -2353,17 +2430,16 @@
           </a:ln>
           <a:extLst>
             <a:ext uri="{C572A759-6A51-4108-AA02-DFA0A04FC94B}">
-              <ma14:wrappingTextBoxFlag xmlns:ma14="http://schemas.microsoft.com/office/mac/drawingml/2011/main" val="1"/>
+              <ma14:wrappingTextBoxFlag xmlns:ma14="http://schemas.microsoft.com/office/mac/drawingml/2011/main" xmlns="" val="1"/>
             </a:ext>
           </a:extLst>
         </p:spPr>
         <p:txBody>
           <a:bodyPr lIns="219456" tIns="219456" rIns="219456" bIns="219456">
-            <a:normAutofit fontScale="100000" lnSpcReduction="0"/>
+            <a:normAutofit/>
           </a:bodyPr>
           <a:lstStyle/>
           <a:p>
-            <a:pPr/>
             <a:r>
               <a:t>Title Text</a:t>
             </a:r>
@@ -2373,7 +2449,9 @@
       <p:sp>
         <p:nvSpPr>
           <p:cNvPr id="3" name="Shape 3"/>
-          <p:cNvSpPr/>
+          <p:cNvSpPr>
+            <a:spLocks noGrp="1"/>
+          </p:cNvSpPr>
           <p:nvPr>
             <p:ph type="body" idx="1"/>
           </p:nvPr>
@@ -2391,17 +2469,16 @@
           </a:ln>
           <a:extLst>
             <a:ext uri="{C572A759-6A51-4108-AA02-DFA0A04FC94B}">
-              <ma14:wrappingTextBoxFlag xmlns:ma14="http://schemas.microsoft.com/office/mac/drawingml/2011/main" val="1"/>
+              <ma14:wrappingTextBoxFlag xmlns:ma14="http://schemas.microsoft.com/office/mac/drawingml/2011/main" xmlns="" val="1"/>
             </a:ext>
           </a:extLst>
         </p:spPr>
         <p:txBody>
           <a:bodyPr lIns="219456" tIns="219456" rIns="219456" bIns="219456" anchor="b">
-            <a:normAutofit fontScale="100000" lnSpcReduction="0"/>
+            <a:normAutofit/>
           </a:bodyPr>
           <a:lstStyle/>
           <a:p>
-            <a:pPr/>
             <a:r>
               <a:t>Body Level One</a:t>
             </a:r>
@@ -2435,7 +2512,9 @@
       <p:sp>
         <p:nvSpPr>
           <p:cNvPr id="4" name="Shape 4"/>
-          <p:cNvSpPr/>
+          <p:cNvSpPr>
+            <a:spLocks noGrp="1"/>
+          </p:cNvSpPr>
           <p:nvPr>
             <p:ph type="sldNum" sz="quarter" idx="2"/>
           </p:nvPr>
@@ -2458,8 +2537,10 @@
           </a:bodyPr>
           <a:lstStyle/>
           <a:p>
-            <a:pPr/>
-            <a:fld id="{86CB4B4D-7CA3-9044-876B-883B54F8677D}" type="slidenum"/>
+            <a:fld id="{86CB4B4D-7CA3-9044-876B-883B54F8677D}" type="slidenum">
+              <a:t>‹#›</a:t>
+            </a:fld>
+            <a:endParaRPr/>
           </a:p>
         </p:txBody>
       </p:sp>
@@ -2467,19 +2548,19 @@
   </p:cSld>
   <p:clrMap bg1="lt1" tx1="dk1" bg2="lt2" tx2="dk2" accent1="accent1" accent2="accent2" accent3="accent3" accent4="accent4" accent5="accent5" accent6="accent6" hlink="hlink" folHlink="folHlink"/>
   <p:sldLayoutIdLst>
-    <p:sldLayoutId id="2147483649" r:id="rId2"/>
-    <p:sldLayoutId id="2147483650" r:id="rId3"/>
-    <p:sldLayoutId id="2147483651" r:id="rId4"/>
-    <p:sldLayoutId id="2147483652" r:id="rId5"/>
-    <p:sldLayoutId id="2147483653" r:id="rId6"/>
-    <p:sldLayoutId id="2147483654" r:id="rId7"/>
-    <p:sldLayoutId id="2147483655" r:id="rId8"/>
-    <p:sldLayoutId id="2147483656" r:id="rId9"/>
-    <p:sldLayoutId id="2147483657" r:id="rId10"/>
-    <p:sldLayoutId id="2147483658" r:id="rId11"/>
-    <p:sldLayoutId id="2147483659" r:id="rId12"/>
+    <p:sldLayoutId id="2147483649" r:id="rId1"/>
+    <p:sldLayoutId id="2147483650" r:id="rId2"/>
+    <p:sldLayoutId id="2147483651" r:id="rId3"/>
+    <p:sldLayoutId id="2147483652" r:id="rId4"/>
+    <p:sldLayoutId id="2147483653" r:id="rId5"/>
+    <p:sldLayoutId id="2147483654" r:id="rId6"/>
+    <p:sldLayoutId id="2147483655" r:id="rId7"/>
+    <p:sldLayoutId id="2147483656" r:id="rId8"/>
+    <p:sldLayoutId id="2147483657" r:id="rId9"/>
+    <p:sldLayoutId id="2147483658" r:id="rId10"/>
+    <p:sldLayoutId id="2147483659" r:id="rId11"/>
   </p:sldLayoutIdLst>
-  <p:transition xmlns:p14="http://schemas.microsoft.com/office/powerpoint/2010/main" spd="med" advClick="1"/>
+  <p:transition spd="med"/>
   <p:txStyles>
     <p:titleStyle>
       <a:lvl1pPr marL="0" marR="0" indent="0" algn="l" defTabSz="4389120" rtl="0" latinLnBrk="0">
@@ -2497,7 +2578,7 @@
         <a:buFontTx/>
         <a:buNone/>
         <a:tabLst/>
-        <a:defRPr b="1" baseline="0" cap="all" i="0" spc="0" strike="noStrike" sz="19200" u="none">
+        <a:defRPr sz="19200" b="1" i="0" u="none" strike="noStrike" cap="all" spc="0" baseline="0">
           <a:ln>
             <a:noFill/>
           </a:ln>
@@ -2526,7 +2607,7 @@
         <a:buFontTx/>
         <a:buNone/>
         <a:tabLst/>
-        <a:defRPr b="1" baseline="0" cap="all" i="0" spc="0" strike="noStrike" sz="19200" u="none">
+        <a:defRPr sz="19200" b="1" i="0" u="none" strike="noStrike" cap="all" spc="0" baseline="0">
           <a:ln>
             <a:noFill/>
           </a:ln>
@@ -2555,7 +2636,7 @@
         <a:buFontTx/>
         <a:buNone/>
         <a:tabLst/>
-        <a:defRPr b="1" baseline="0" cap="all" i="0" spc="0" strike="noStrike" sz="19200" u="none">
+        <a:defRPr sz="19200" b="1" i="0" u="none" strike="noStrike" cap="all" spc="0" baseline="0">
           <a:ln>
             <a:noFill/>
           </a:ln>
@@ -2584,7 +2665,7 @@
         <a:buFontTx/>
         <a:buNone/>
         <a:tabLst/>
-        <a:defRPr b="1" baseline="0" cap="all" i="0" spc="0" strike="noStrike" sz="19200" u="none">
+        <a:defRPr sz="19200" b="1" i="0" u="none" strike="noStrike" cap="all" spc="0" baseline="0">
           <a:ln>
             <a:noFill/>
           </a:ln>
@@ -2613,7 +2694,7 @@
         <a:buFontTx/>
         <a:buNone/>
         <a:tabLst/>
-        <a:defRPr b="1" baseline="0" cap="all" i="0" spc="0" strike="noStrike" sz="19200" u="none">
+        <a:defRPr sz="19200" b="1" i="0" u="none" strike="noStrike" cap="all" spc="0" baseline="0">
           <a:ln>
             <a:noFill/>
           </a:ln>
@@ -2642,7 +2723,7 @@
         <a:buFontTx/>
         <a:buNone/>
         <a:tabLst/>
-        <a:defRPr b="1" baseline="0" cap="all" i="0" spc="0" strike="noStrike" sz="19200" u="none">
+        <a:defRPr sz="19200" b="1" i="0" u="none" strike="noStrike" cap="all" spc="0" baseline="0">
           <a:ln>
             <a:noFill/>
           </a:ln>
@@ -2671,7 +2752,7 @@
         <a:buFontTx/>
         <a:buNone/>
         <a:tabLst/>
-        <a:defRPr b="1" baseline="0" cap="all" i="0" spc="0" strike="noStrike" sz="19200" u="none">
+        <a:defRPr sz="19200" b="1" i="0" u="none" strike="noStrike" cap="all" spc="0" baseline="0">
           <a:ln>
             <a:noFill/>
           </a:ln>
@@ -2700,7 +2781,7 @@
         <a:buFontTx/>
         <a:buNone/>
         <a:tabLst/>
-        <a:defRPr b="1" baseline="0" cap="all" i="0" spc="0" strike="noStrike" sz="19200" u="none">
+        <a:defRPr sz="19200" b="1" i="0" u="none" strike="noStrike" cap="all" spc="0" baseline="0">
           <a:ln>
             <a:noFill/>
           </a:ln>
@@ -2729,7 +2810,7 @@
         <a:buFontTx/>
         <a:buNone/>
         <a:tabLst/>
-        <a:defRPr b="1" baseline="0" cap="all" i="0" spc="0" strike="noStrike" sz="19200" u="none">
+        <a:defRPr sz="19200" b="1" i="0" u="none" strike="noStrike" cap="all" spc="0" baseline="0">
           <a:ln>
             <a:noFill/>
           </a:ln>
@@ -2760,7 +2841,7 @@
         <a:buFontTx/>
         <a:buNone/>
         <a:tabLst/>
-        <a:defRPr b="0" baseline="0" cap="none" i="0" spc="0" strike="noStrike" sz="9600" u="none">
+        <a:defRPr sz="9600" b="0" i="0" u="none" strike="noStrike" cap="none" spc="0" baseline="0">
           <a:ln>
             <a:noFill/>
           </a:ln>
@@ -2789,7 +2870,7 @@
         <a:buFontTx/>
         <a:buNone/>
         <a:tabLst/>
-        <a:defRPr b="0" baseline="0" cap="none" i="0" spc="0" strike="noStrike" sz="9600" u="none">
+        <a:defRPr sz="9600" b="0" i="0" u="none" strike="noStrike" cap="none" spc="0" baseline="0">
           <a:ln>
             <a:noFill/>
           </a:ln>
@@ -2818,7 +2899,7 @@
         <a:buFontTx/>
         <a:buNone/>
         <a:tabLst/>
-        <a:defRPr b="0" baseline="0" cap="none" i="0" spc="0" strike="noStrike" sz="9600" u="none">
+        <a:defRPr sz="9600" b="0" i="0" u="none" strike="noStrike" cap="none" spc="0" baseline="0">
           <a:ln>
             <a:noFill/>
           </a:ln>
@@ -2847,7 +2928,7 @@
         <a:buFontTx/>
         <a:buNone/>
         <a:tabLst/>
-        <a:defRPr b="0" baseline="0" cap="none" i="0" spc="0" strike="noStrike" sz="9600" u="none">
+        <a:defRPr sz="9600" b="0" i="0" u="none" strike="noStrike" cap="none" spc="0" baseline="0">
           <a:ln>
             <a:noFill/>
           </a:ln>
@@ -2876,7 +2957,7 @@
         <a:buFontTx/>
         <a:buNone/>
         <a:tabLst/>
-        <a:defRPr b="0" baseline="0" cap="none" i="0" spc="0" strike="noStrike" sz="9600" u="none">
+        <a:defRPr sz="9600" b="0" i="0" u="none" strike="noStrike" cap="none" spc="0" baseline="0">
           <a:ln>
             <a:noFill/>
           </a:ln>
@@ -2905,7 +2986,7 @@
         <a:buFontTx/>
         <a:buNone/>
         <a:tabLst/>
-        <a:defRPr b="0" baseline="0" cap="none" i="0" spc="0" strike="noStrike" sz="9600" u="none">
+        <a:defRPr sz="9600" b="0" i="0" u="none" strike="noStrike" cap="none" spc="0" baseline="0">
           <a:ln>
             <a:noFill/>
           </a:ln>
@@ -2934,7 +3015,7 @@
         <a:buFontTx/>
         <a:buNone/>
         <a:tabLst/>
-        <a:defRPr b="0" baseline="0" cap="none" i="0" spc="0" strike="noStrike" sz="9600" u="none">
+        <a:defRPr sz="9600" b="0" i="0" u="none" strike="noStrike" cap="none" spc="0" baseline="0">
           <a:ln>
             <a:noFill/>
           </a:ln>
@@ -2963,7 +3044,7 @@
         <a:buFontTx/>
         <a:buNone/>
         <a:tabLst/>
-        <a:defRPr b="0" baseline="0" cap="none" i="0" spc="0" strike="noStrike" sz="9600" u="none">
+        <a:defRPr sz="9600" b="0" i="0" u="none" strike="noStrike" cap="none" spc="0" baseline="0">
           <a:ln>
             <a:noFill/>
           </a:ln>
@@ -2992,7 +3073,7 @@
         <a:buFontTx/>
         <a:buNone/>
         <a:tabLst/>
-        <a:defRPr b="0" baseline="0" cap="none" i="0" spc="0" strike="noStrike" sz="9600" u="none">
+        <a:defRPr sz="9600" b="0" i="0" u="none" strike="noStrike" cap="none" spc="0" baseline="0">
           <a:ln>
             <a:noFill/>
           </a:ln>
@@ -3023,7 +3104,7 @@
         <a:buFontTx/>
         <a:buNone/>
         <a:tabLst/>
-        <a:defRPr b="0" baseline="0" cap="none" i="0" spc="0" strike="noStrike" sz="8600" u="none">
+        <a:defRPr sz="8600" b="0" i="0" u="none" strike="noStrike" cap="none" spc="0" baseline="0">
           <a:ln>
             <a:noFill/>
           </a:ln>
@@ -3052,7 +3133,7 @@
         <a:buFontTx/>
         <a:buNone/>
         <a:tabLst/>
-        <a:defRPr b="0" baseline="0" cap="none" i="0" spc="0" strike="noStrike" sz="8600" u="none">
+        <a:defRPr sz="8600" b="0" i="0" u="none" strike="noStrike" cap="none" spc="0" baseline="0">
           <a:ln>
             <a:noFill/>
           </a:ln>
@@ -3081,7 +3162,7 @@
         <a:buFontTx/>
         <a:buNone/>
         <a:tabLst/>
-        <a:defRPr b="0" baseline="0" cap="none" i="0" spc="0" strike="noStrike" sz="8600" u="none">
+        <a:defRPr sz="8600" b="0" i="0" u="none" strike="noStrike" cap="none" spc="0" baseline="0">
           <a:ln>
             <a:noFill/>
           </a:ln>
@@ -3110,7 +3191,7 @@
         <a:buFontTx/>
         <a:buNone/>
         <a:tabLst/>
-        <a:defRPr b="0" baseline="0" cap="none" i="0" spc="0" strike="noStrike" sz="8600" u="none">
+        <a:defRPr sz="8600" b="0" i="0" u="none" strike="noStrike" cap="none" spc="0" baseline="0">
           <a:ln>
             <a:noFill/>
           </a:ln>
@@ -3139,7 +3220,7 @@
         <a:buFontTx/>
         <a:buNone/>
         <a:tabLst/>
-        <a:defRPr b="0" baseline="0" cap="none" i="0" spc="0" strike="noStrike" sz="8600" u="none">
+        <a:defRPr sz="8600" b="0" i="0" u="none" strike="noStrike" cap="none" spc="0" baseline="0">
           <a:ln>
             <a:noFill/>
           </a:ln>
@@ -3168,7 +3249,7 @@
         <a:buFontTx/>
         <a:buNone/>
         <a:tabLst/>
-        <a:defRPr b="0" baseline="0" cap="none" i="0" spc="0" strike="noStrike" sz="8600" u="none">
+        <a:defRPr sz="8600" b="0" i="0" u="none" strike="noStrike" cap="none" spc="0" baseline="0">
           <a:ln>
             <a:noFill/>
           </a:ln>
@@ -3197,7 +3278,7 @@
         <a:buFontTx/>
         <a:buNone/>
         <a:tabLst/>
-        <a:defRPr b="0" baseline="0" cap="none" i="0" spc="0" strike="noStrike" sz="8600" u="none">
+        <a:defRPr sz="8600" b="0" i="0" u="none" strike="noStrike" cap="none" spc="0" baseline="0">
           <a:ln>
             <a:noFill/>
           </a:ln>
@@ -3226,7 +3307,7 @@
         <a:buFontTx/>
         <a:buNone/>
         <a:tabLst/>
-        <a:defRPr b="0" baseline="0" cap="none" i="0" spc="0" strike="noStrike" sz="8600" u="none">
+        <a:defRPr sz="8600" b="0" i="0" u="none" strike="noStrike" cap="none" spc="0" baseline="0">
           <a:ln>
             <a:noFill/>
           </a:ln>
@@ -3255,7 +3336,7 @@
         <a:buFontTx/>
         <a:buNone/>
         <a:tabLst/>
-        <a:defRPr b="0" baseline="0" cap="none" i="0" spc="0" strike="noStrike" sz="8600" u="none">
+        <a:defRPr sz="8600" b="0" i="0" u="none" strike="noStrike" cap="none" spc="0" baseline="0">
           <a:ln>
             <a:noFill/>
           </a:ln>
@@ -3275,7 +3356,7 @@
 </file>
 
 <file path=ppt/slides/slide1.xml><?xml version="1.0" encoding="utf-8"?>
-<p:sld xmlns:a="http://schemas.openxmlformats.org/drawingml/2006/main" xmlns:r="http://schemas.openxmlformats.org/officeDocument/2006/relationships" xmlns:p="http://schemas.openxmlformats.org/presentationml/2006/main" showMasterSp="1" showMasterPhAnim="1">
+<p:sld xmlns:a="http://schemas.openxmlformats.org/drawingml/2006/main" xmlns:r="http://schemas.openxmlformats.org/officeDocument/2006/relationships" xmlns:p="http://schemas.openxmlformats.org/presentationml/2006/main">
   <p:cSld>
     <p:spTree>
       <p:nvGrpSpPr>
@@ -3310,7 +3391,7 @@
           </a:ln>
           <a:extLst>
             <a:ext uri="{C572A759-6A51-4108-AA02-DFA0A04FC94B}">
-              <ma14:wrappingTextBoxFlag xmlns:ma14="http://schemas.microsoft.com/office/mac/drawingml/2011/main" val="1"/>
+              <ma14:wrappingTextBoxFlag xmlns:ma14="http://schemas.microsoft.com/office/mac/drawingml/2011/main" xmlns="" val="1"/>
             </a:ext>
           </a:extLst>
         </p:spPr>
@@ -3329,7 +3410,7 @@
           </a:p>
           <a:p>
             <a:pPr algn="ctr">
-              <a:defRPr b="1" sz="6000"/>
+              <a:defRPr sz="6000" b="1"/>
             </a:pPr>
             <a:r>
               <a:t>Victor Johnson &amp; Camille Rasmussen</a:t>
@@ -3361,7 +3442,7 @@
           <a:bodyPr lIns="45718" tIns="45718" rIns="45718" bIns="45718"/>
           <a:lstStyle/>
           <a:p>
-            <a:pPr/>
+            <a:endParaRPr/>
           </a:p>
         </p:txBody>
       </p:sp>
@@ -3413,7 +3494,7 @@
           </a:ln>
           <a:extLst>
             <a:ext uri="{C572A759-6A51-4108-AA02-DFA0A04FC94B}">
-              <ma14:wrappingTextBoxFlag xmlns:ma14="http://schemas.microsoft.com/office/mac/drawingml/2011/main" val="1"/>
+              <ma14:wrappingTextBoxFlag xmlns:ma14="http://schemas.microsoft.com/office/mac/drawingml/2011/main" xmlns="" val="1"/>
             </a:ext>
           </a:extLst>
         </p:spPr>
@@ -3425,7 +3506,6 @@
             <a:lvl1pPr algn="ctr"/>
           </a:lstStyle>
           <a:p>
-            <a:pPr/>
             <a:r>
               <a:t>System design</a:t>
             </a:r>
@@ -3451,7 +3531,7 @@
           </a:ln>
           <a:extLst>
             <a:ext uri="{C572A759-6A51-4108-AA02-DFA0A04FC94B}">
-              <ma14:wrappingTextBoxFlag xmlns:ma14="http://schemas.microsoft.com/office/mac/drawingml/2011/main" val="1"/>
+              <ma14:wrappingTextBoxFlag xmlns:ma14="http://schemas.microsoft.com/office/mac/drawingml/2011/main" xmlns="" val="1"/>
             </a:ext>
           </a:extLst>
         </p:spPr>
@@ -3465,7 +3545,6 @@
             </a:lvl1pPr>
           </a:lstStyle>
           <a:p>
-            <a:pPr/>
             <a:r>
               <a:t>Document</a:t>
             </a:r>
@@ -3491,7 +3570,7 @@
           </a:ln>
           <a:extLst>
             <a:ext uri="{C572A759-6A51-4108-AA02-DFA0A04FC94B}">
-              <ma14:wrappingTextBoxFlag xmlns:ma14="http://schemas.microsoft.com/office/mac/drawingml/2011/main" val="1"/>
+              <ma14:wrappingTextBoxFlag xmlns:ma14="http://schemas.microsoft.com/office/mac/drawingml/2011/main" xmlns="" val="1"/>
             </a:ext>
           </a:extLst>
         </p:spPr>
@@ -3551,7 +3630,7 @@
           </a:ln>
           <a:extLst>
             <a:ext uri="{C572A759-6A51-4108-AA02-DFA0A04FC94B}">
-              <ma14:wrappingTextBoxFlag xmlns:ma14="http://schemas.microsoft.com/office/mac/drawingml/2011/main" val="1"/>
+              <ma14:wrappingTextBoxFlag xmlns:ma14="http://schemas.microsoft.com/office/mac/drawingml/2011/main" xmlns="" val="1"/>
             </a:ext>
           </a:extLst>
         </p:spPr>
@@ -3565,7 +3644,6 @@
             </a:lvl1pPr>
           </a:lstStyle>
           <a:p>
-            <a:pPr/>
             <a:r>
               <a:t>Resolver</a:t>
             </a:r>
@@ -3591,7 +3669,7 @@
           </a:ln>
           <a:extLst>
             <a:ext uri="{C572A759-6A51-4108-AA02-DFA0A04FC94B}">
-              <ma14:wrappingTextBoxFlag xmlns:ma14="http://schemas.microsoft.com/office/mac/drawingml/2011/main" val="1"/>
+              <ma14:wrappingTextBoxFlag xmlns:ma14="http://schemas.microsoft.com/office/mac/drawingml/2011/main" xmlns="" val="1"/>
             </a:ext>
           </a:extLst>
         </p:spPr>
@@ -3640,7 +3718,7 @@
         </p:nvSpPr>
         <p:spPr>
           <a:xfrm>
-            <a:off x="8952179" y="18140502"/>
+            <a:off x="8952179" y="17455306"/>
             <a:ext cx="4244442" cy="802639"/>
           </a:xfrm>
           <a:prstGeom prst="rect">
@@ -3651,7 +3729,7 @@
           </a:ln>
           <a:extLst>
             <a:ext uri="{C572A759-6A51-4108-AA02-DFA0A04FC94B}">
-              <ma14:wrappingTextBoxFlag xmlns:ma14="http://schemas.microsoft.com/office/mac/drawingml/2011/main" val="1"/>
+              <ma14:wrappingTextBoxFlag xmlns:ma14="http://schemas.microsoft.com/office/mac/drawingml/2011/main" xmlns="" val="1"/>
             </a:ext>
           </a:extLst>
         </p:spPr>
@@ -3665,42 +3743,13 @@
             </a:lvl1pPr>
           </a:lstStyle>
           <a:p>
-            <a:pPr/>
-            <a:r>
+            <a:r>
+              <a:rPr dirty="0"/>
               <a:t>The Algorithm</a:t>
             </a:r>
           </a:p>
         </p:txBody>
       </p:sp>
-      <p:pic>
-        <p:nvPicPr>
-          <p:cNvPr id="121" name="image1.jpeg"/>
-          <p:cNvPicPr>
-            <a:picLocks noChangeAspect="1"/>
-          </p:cNvPicPr>
-          <p:nvPr/>
-        </p:nvPicPr>
-        <p:blipFill>
-          <a:blip r:embed="rId3">
-            <a:extLst/>
-          </a:blip>
-          <a:stretch>
-            <a:fillRect/>
-          </a:stretch>
-        </p:blipFill>
-        <p:spPr>
-          <a:xfrm>
-            <a:off x="2010286" y="19080836"/>
-            <a:ext cx="18128228" cy="14008177"/>
-          </a:xfrm>
-          <a:prstGeom prst="rect">
-            <a:avLst/>
-          </a:prstGeom>
-          <a:ln w="12700">
-            <a:miter lim="400000"/>
-          </a:ln>
-        </p:spPr>
-      </p:pic>
       <p:sp>
         <p:nvSpPr>
           <p:cNvPr id="122" name="Shape 122"/>
@@ -3720,7 +3769,7 @@
           </a:ln>
           <a:extLst>
             <a:ext uri="{C572A759-6A51-4108-AA02-DFA0A04FC94B}">
-              <ma14:wrappingTextBoxFlag xmlns:ma14="http://schemas.microsoft.com/office/mac/drawingml/2011/main" val="1"/>
+              <ma14:wrappingTextBoxFlag xmlns:ma14="http://schemas.microsoft.com/office/mac/drawingml/2011/main" xmlns="" val="1"/>
             </a:ext>
           </a:extLst>
         </p:spPr>
@@ -3732,7 +3781,6 @@
             <a:lvl1pPr algn="ctr"/>
           </a:lstStyle>
           <a:p>
-            <a:pPr/>
             <a:r>
               <a:t>Performance</a:t>
             </a:r>
@@ -3758,7 +3806,7 @@
           </a:ln>
           <a:extLst>
             <a:ext uri="{C572A759-6A51-4108-AA02-DFA0A04FC94B}">
-              <ma14:wrappingTextBoxFlag xmlns:ma14="http://schemas.microsoft.com/office/mac/drawingml/2011/main" val="1"/>
+              <ma14:wrappingTextBoxFlag xmlns:ma14="http://schemas.microsoft.com/office/mac/drawingml/2011/main" xmlns="" val="1"/>
             </a:ext>
           </a:extLst>
         </p:spPr>
@@ -3772,7 +3820,6 @@
             </a:lvl1pPr>
           </a:lstStyle>
           <a:p>
-            <a:pPr/>
             <a:r>
               <a:t>With 57% accuracy on test set 2 and 63% accuracy on test set 3, our coreference resolver performed quite similarly on both test sets. This similarity can be attributed the general approach that was taken.</a:t>
             </a:r>
@@ -3798,7 +3845,7 @@
           </a:ln>
           <a:extLst>
             <a:ext uri="{C572A759-6A51-4108-AA02-DFA0A04FC94B}">
-              <ma14:wrappingTextBoxFlag xmlns:ma14="http://schemas.microsoft.com/office/mac/drawingml/2011/main" val="1"/>
+              <ma14:wrappingTextBoxFlag xmlns:ma14="http://schemas.microsoft.com/office/mac/drawingml/2011/main" xmlns="" val="1"/>
             </a:ext>
           </a:extLst>
         </p:spPr>
@@ -3812,7 +3859,6 @@
             </a:lvl1pPr>
           </a:lstStyle>
           <a:p>
-            <a:pPr/>
             <a:r>
               <a:t>We opted to take a simple and general approach to resolving coreferences. The majority of references are found using string matching techniques. The remaining references are resolved by guessing the gender and plurality of noun phrases and using those to match similar noun phrases.</a:t>
             </a:r>
@@ -3838,7 +3884,7 @@
           </a:ln>
           <a:extLst>
             <a:ext uri="{C572A759-6A51-4108-AA02-DFA0A04FC94B}">
-              <ma14:wrappingTextBoxFlag xmlns:ma14="http://schemas.microsoft.com/office/mac/drawingml/2011/main" val="1"/>
+              <ma14:wrappingTextBoxFlag xmlns:ma14="http://schemas.microsoft.com/office/mac/drawingml/2011/main" xmlns="" val="1"/>
             </a:ext>
           </a:extLst>
         </p:spPr>
@@ -3852,7 +3898,6 @@
             </a:lvl1pPr>
           </a:lstStyle>
           <a:p>
-            <a:pPr/>
             <a:r>
               <a:t>Complications</a:t>
             </a:r>
@@ -3878,7 +3923,7 @@
           </a:ln>
           <a:extLst>
             <a:ext uri="{C572A759-6A51-4108-AA02-DFA0A04FC94B}">
-              <ma14:wrappingTextBoxFlag xmlns:ma14="http://schemas.microsoft.com/office/mac/drawingml/2011/main" val="1"/>
+              <ma14:wrappingTextBoxFlag xmlns:ma14="http://schemas.microsoft.com/office/mac/drawingml/2011/main" xmlns="" val="1"/>
             </a:ext>
           </a:extLst>
         </p:spPr>
@@ -3892,7 +3937,6 @@
             </a:lvl1pPr>
           </a:lstStyle>
           <a:p>
-            <a:pPr/>
             <a:r>
               <a:t>Successes</a:t>
             </a:r>
@@ -3918,7 +3962,7 @@
           </a:ln>
           <a:extLst>
             <a:ext uri="{C572A759-6A51-4108-AA02-DFA0A04FC94B}">
-              <ma14:wrappingTextBoxFlag xmlns:ma14="http://schemas.microsoft.com/office/mac/drawingml/2011/main" val="1"/>
+              <ma14:wrappingTextBoxFlag xmlns:ma14="http://schemas.microsoft.com/office/mac/drawingml/2011/main" xmlns="" val="1"/>
             </a:ext>
           </a:extLst>
         </p:spPr>
@@ -3968,7 +4012,7 @@
           </a:ln>
           <a:extLst>
             <a:ext uri="{C572A759-6A51-4108-AA02-DFA0A04FC94B}">
-              <ma14:wrappingTextBoxFlag xmlns:ma14="http://schemas.microsoft.com/office/mac/drawingml/2011/main" val="1"/>
+              <ma14:wrappingTextBoxFlag xmlns:ma14="http://schemas.microsoft.com/office/mac/drawingml/2011/main" xmlns="" val="1"/>
             </a:ext>
           </a:extLst>
         </p:spPr>
@@ -4018,7 +4062,7 @@
           </a:ln>
           <a:extLst>
             <a:ext uri="{C572A759-6A51-4108-AA02-DFA0A04FC94B}">
-              <ma14:wrappingTextBoxFlag xmlns:ma14="http://schemas.microsoft.com/office/mac/drawingml/2011/main" val="1"/>
+              <ma14:wrappingTextBoxFlag xmlns:ma14="http://schemas.microsoft.com/office/mac/drawingml/2011/main" xmlns="" val="1"/>
             </a:ext>
           </a:extLst>
         </p:spPr>
@@ -4032,7 +4076,6 @@
             </a:lvl1pPr>
           </a:lstStyle>
           <a:p>
-            <a:pPr/>
             <a:r>
               <a:t>Main Contributor: Victor Johnson</a:t>
             </a:r>
@@ -4058,7 +4101,7 @@
           </a:ln>
           <a:extLst>
             <a:ext uri="{C572A759-6A51-4108-AA02-DFA0A04FC94B}">
-              <ma14:wrappingTextBoxFlag xmlns:ma14="http://schemas.microsoft.com/office/mac/drawingml/2011/main" val="1"/>
+              <ma14:wrappingTextBoxFlag xmlns:ma14="http://schemas.microsoft.com/office/mac/drawingml/2011/main" xmlns="" val="1"/>
             </a:ext>
           </a:extLst>
         </p:spPr>
@@ -4072,7 +4115,6 @@
             </a:lvl1pPr>
           </a:lstStyle>
           <a:p>
-            <a:pPr/>
             <a:r>
               <a:t>Main Contributor: Camille Rasmussen</a:t>
             </a:r>
@@ -4098,7 +4140,7 @@
           </a:ln>
           <a:extLst>
             <a:ext uri="{C572A759-6A51-4108-AA02-DFA0A04FC94B}">
-              <ma14:wrappingTextBoxFlag xmlns:ma14="http://schemas.microsoft.com/office/mac/drawingml/2011/main" val="1"/>
+              <ma14:wrappingTextBoxFlag xmlns:ma14="http://schemas.microsoft.com/office/mac/drawingml/2011/main" xmlns="" val="1"/>
             </a:ext>
           </a:extLst>
         </p:spPr>
@@ -4112,7 +4154,6 @@
             </a:lvl1pPr>
           </a:lstStyle>
           <a:p>
-            <a:pPr/>
             <a:r>
               <a:t>By keeping our approach more general and not relying on the parse tree or other document specific attributes we were able to perform well on all test sets.  Because of this plan, the majority of our time was spent tuning the parts of the resolver responsible for string matching and finding pronoun matches.</a:t>
             </a:r>
@@ -4139,7 +4180,7 @@
             </a:solidFill>
           </a:ln>
           <a:effectLst>
-            <a:outerShdw sx="100000" sy="100000" kx="0" ky="0" algn="b" rotWithShape="0" blurRad="38100" dist="23000" dir="5400000">
+            <a:outerShdw blurRad="38100" dist="23000" dir="5400000" rotWithShape="0">
               <a:srgbClr val="000000">
                 <a:alpha val="35000"/>
               </a:srgbClr>
@@ -4150,21 +4191,51 @@
           <a:bodyPr lIns="45718" tIns="45718" rIns="45718" bIns="45718"/>
           <a:lstStyle/>
           <a:p>
-            <a:pPr/>
+            <a:endParaRPr/>
           </a:p>
         </p:txBody>
       </p:sp>
+      <p:pic>
+        <p:nvPicPr>
+          <p:cNvPr id="2" name="Picture 1"/>
+          <p:cNvPicPr>
+            <a:picLocks noChangeAspect="1"/>
+          </p:cNvPicPr>
+          <p:nvPr/>
+        </p:nvPicPr>
+        <p:blipFill>
+          <a:blip r:embed="rId3">
+            <a:extLst>
+              <a:ext uri="{28A0092B-C50C-407E-A947-70E740481C1C}">
+                <a14:useLocalDpi xmlns:a14="http://schemas.microsoft.com/office/drawing/2010/main" val="0"/>
+              </a:ext>
+            </a:extLst>
+          </a:blip>
+          <a:stretch>
+            <a:fillRect/>
+          </a:stretch>
+        </p:blipFill>
+        <p:spPr>
+          <a:xfrm>
+            <a:off x="1411640" y="18153202"/>
+            <a:ext cx="19325520" cy="14933355"/>
+          </a:xfrm>
+          <a:prstGeom prst="rect">
+            <a:avLst/>
+          </a:prstGeom>
+        </p:spPr>
+      </p:pic>
     </p:spTree>
   </p:cSld>
   <p:clrMapOvr>
     <a:masterClrMapping/>
   </p:clrMapOvr>
-  <p:transition xmlns:p14="http://schemas.microsoft.com/office/powerpoint/2010/main" spd="med" advClick="1"/>
+  <p:transition spd="med"/>
 </p:sld>
 </file>
 
 <file path=ppt/theme/theme1.xml><?xml version="1.0" encoding="utf-8"?>
-<a:theme xmlns:a="http://schemas.openxmlformats.org/drawingml/2006/main" xmlns:r="http://schemas.openxmlformats.org/officeDocument/2006/relationships" name="Office Theme">
+<a:theme xmlns:a="http://schemas.openxmlformats.org/drawingml/2006/main" name="Office Theme">
   <a:themeElements>
     <a:clrScheme name="Office Theme">
       <a:dk1>
@@ -4290,7 +4361,7 @@
       <a:effectStyleLst>
         <a:effectStyle>
           <a:effectLst>
-            <a:outerShdw sx="100000" sy="100000" kx="0" ky="0" algn="b" rotWithShape="0" blurRad="38100" dist="23000" dir="5400000">
+            <a:outerShdw blurRad="38100" dist="23000" dir="5400000" rotWithShape="0">
               <a:srgbClr val="000000">
                 <a:alpha val="35000"/>
               </a:srgbClr>
@@ -4299,7 +4370,7 @@
         </a:effectStyle>
         <a:effectStyle>
           <a:effectLst>
-            <a:outerShdw sx="100000" sy="100000" kx="0" ky="0" algn="b" rotWithShape="0" blurRad="38100" dist="23000" dir="5400000">
+            <a:outerShdw blurRad="38100" dist="23000" dir="5400000" rotWithShape="0">
               <a:srgbClr val="000000">
                 <a:alpha val="35000"/>
               </a:srgbClr>
@@ -4308,7 +4379,7 @@
         </a:effectStyle>
         <a:effectStyle>
           <a:effectLst>
-            <a:outerShdw sx="100000" sy="100000" kx="0" ky="0" algn="b" rotWithShape="0" blurRad="38100" dist="23000" dir="5400000">
+            <a:outerShdw blurRad="38100" dist="23000" dir="5400000" rotWithShape="0">
               <a:srgbClr val="000000">
                 <a:alpha val="35000"/>
               </a:srgbClr>
@@ -4382,7 +4453,7 @@
           <a:round/>
         </a:ln>
         <a:effectLst>
-          <a:outerShdw sx="100000" sy="100000" kx="0" ky="0" algn="b" rotWithShape="0" blurRad="38100" dist="23000" dir="5400000">
+          <a:outerShdw blurRad="38100" dist="23000" dir="5400000" rotWithShape="0">
             <a:srgbClr val="000000">
               <a:alpha val="35000"/>
             </a:srgbClr>
@@ -4390,7 +4461,7 @@
         </a:effectLst>
         <a:sp3d/>
       </a:spPr>
-      <a:bodyPr rot="0" spcFirstLastPara="1" vertOverflow="overflow" horzOverflow="overflow" vert="horz" wrap="square" lIns="45718" tIns="45718" rIns="45718" bIns="45718" numCol="1" spcCol="38100" rtlCol="0" anchor="ctr" upright="0">
+      <a:bodyPr rot="0" spcFirstLastPara="1" vertOverflow="overflow" horzOverflow="overflow" vert="horz" wrap="square" lIns="45718" tIns="45718" rIns="45718" bIns="45718" numCol="1" spcCol="38100" rtlCol="0" anchor="ctr">
         <a:spAutoFit/>
       </a:bodyPr>
       <a:lstStyle>
@@ -4409,7 +4480,7 @@
           <a:buFontTx/>
           <a:buNone/>
           <a:tabLst/>
-          <a:defRPr b="0" baseline="0" cap="none" i="0" spc="0" strike="noStrike" sz="8600" u="none" kumimoji="0" normalizeH="0">
+          <a:defRPr kumimoji="0" sz="8600" b="0" i="0" u="none" strike="noStrike" cap="none" spc="0" normalizeH="0" baseline="0">
             <a:ln>
               <a:noFill/>
             </a:ln>
@@ -4439,7 +4510,7 @@
           <a:buFontTx/>
           <a:buNone/>
           <a:tabLst/>
-          <a:defRPr b="0" baseline="0" cap="none" i="0" spc="0" strike="noStrike" sz="1800" u="none" kumimoji="0" normalizeH="0">
+          <a:defRPr kumimoji="0" sz="1800" b="0" i="0" u="none" strike="noStrike" cap="none" spc="0" normalizeH="0" baseline="0">
             <a:ln>
               <a:noFill/>
             </a:ln>
@@ -4465,7 +4536,7 @@
           <a:buFontTx/>
           <a:buNone/>
           <a:tabLst/>
-          <a:defRPr b="0" baseline="0" cap="none" i="0" spc="0" strike="noStrike" sz="1800" u="none" kumimoji="0" normalizeH="0">
+          <a:defRPr kumimoji="0" sz="1800" b="0" i="0" u="none" strike="noStrike" cap="none" spc="0" normalizeH="0" baseline="0">
             <a:ln>
               <a:noFill/>
             </a:ln>
@@ -4491,7 +4562,7 @@
           <a:buFontTx/>
           <a:buNone/>
           <a:tabLst/>
-          <a:defRPr b="0" baseline="0" cap="none" i="0" spc="0" strike="noStrike" sz="1800" u="none" kumimoji="0" normalizeH="0">
+          <a:defRPr kumimoji="0" sz="1800" b="0" i="0" u="none" strike="noStrike" cap="none" spc="0" normalizeH="0" baseline="0">
             <a:ln>
               <a:noFill/>
             </a:ln>
@@ -4517,7 +4588,7 @@
           <a:buFontTx/>
           <a:buNone/>
           <a:tabLst/>
-          <a:defRPr b="0" baseline="0" cap="none" i="0" spc="0" strike="noStrike" sz="1800" u="none" kumimoji="0" normalizeH="0">
+          <a:defRPr kumimoji="0" sz="1800" b="0" i="0" u="none" strike="noStrike" cap="none" spc="0" normalizeH="0" baseline="0">
             <a:ln>
               <a:noFill/>
             </a:ln>
@@ -4543,7 +4614,7 @@
           <a:buFontTx/>
           <a:buNone/>
           <a:tabLst/>
-          <a:defRPr b="0" baseline="0" cap="none" i="0" spc="0" strike="noStrike" sz="1800" u="none" kumimoji="0" normalizeH="0">
+          <a:defRPr kumimoji="0" sz="1800" b="0" i="0" u="none" strike="noStrike" cap="none" spc="0" normalizeH="0" baseline="0">
             <a:ln>
               <a:noFill/>
             </a:ln>
@@ -4569,7 +4640,7 @@
           <a:buFontTx/>
           <a:buNone/>
           <a:tabLst/>
-          <a:defRPr b="0" baseline="0" cap="none" i="0" spc="0" strike="noStrike" sz="1800" u="none" kumimoji="0" normalizeH="0">
+          <a:defRPr kumimoji="0" sz="1800" b="0" i="0" u="none" strike="noStrike" cap="none" spc="0" normalizeH="0" baseline="0">
             <a:ln>
               <a:noFill/>
             </a:ln>
@@ -4595,7 +4666,7 @@
           <a:buFontTx/>
           <a:buNone/>
           <a:tabLst/>
-          <a:defRPr b="0" baseline="0" cap="none" i="0" spc="0" strike="noStrike" sz="1800" u="none" kumimoji="0" normalizeH="0">
+          <a:defRPr kumimoji="0" sz="1800" b="0" i="0" u="none" strike="noStrike" cap="none" spc="0" normalizeH="0" baseline="0">
             <a:ln>
               <a:noFill/>
             </a:ln>
@@ -4621,7 +4692,7 @@
           <a:buFontTx/>
           <a:buNone/>
           <a:tabLst/>
-          <a:defRPr b="0" baseline="0" cap="none" i="0" spc="0" strike="noStrike" sz="1800" u="none" kumimoji="0" normalizeH="0">
+          <a:defRPr kumimoji="0" sz="1800" b="0" i="0" u="none" strike="noStrike" cap="none" spc="0" normalizeH="0" baseline="0">
             <a:ln>
               <a:noFill/>
             </a:ln>
@@ -4647,7 +4718,7 @@
           <a:buFontTx/>
           <a:buNone/>
           <a:tabLst/>
-          <a:defRPr b="0" baseline="0" cap="none" i="0" spc="0" strike="noStrike" sz="1800" u="none" kumimoji="0" normalizeH="0">
+          <a:defRPr kumimoji="0" sz="1800" b="0" i="0" u="none" strike="noStrike" cap="none" spc="0" normalizeH="0" baseline="0">
             <a:ln>
               <a:noFill/>
             </a:ln>
@@ -4660,9 +4731,15 @@
         </a:lvl9pPr>
       </a:lstStyle>
       <a:style>
-        <a:lnRef idx="0"/>
-        <a:fillRef idx="0"/>
-        <a:effectRef idx="0"/>
+        <a:lnRef idx="0">
+          <a:scrgbClr r="0" g="0" b="0"/>
+        </a:lnRef>
+        <a:fillRef idx="0">
+          <a:scrgbClr r="0" g="0" b="0"/>
+        </a:fillRef>
+        <a:effectRef idx="0">
+          <a:scrgbClr r="0" g="0" b="0"/>
+        </a:effectRef>
         <a:fontRef idx="none"/>
       </a:style>
     </a:spDef>
@@ -4677,7 +4754,7 @@
           <a:round/>
         </a:ln>
         <a:effectLst>
-          <a:outerShdw sx="100000" sy="100000" kx="0" ky="0" algn="b" rotWithShape="0" blurRad="38100" dist="23000" dir="5400000">
+          <a:outerShdw blurRad="38100" dist="23000" dir="5400000" rotWithShape="0">
             <a:srgbClr val="000000">
               <a:alpha val="35000"/>
             </a:srgbClr>
@@ -4685,7 +4762,7 @@
         </a:effectLst>
         <a:sp3d/>
       </a:spPr>
-      <a:bodyPr rot="0" spcFirstLastPara="1" vertOverflow="overflow" horzOverflow="overflow" vert="horz" wrap="square" lIns="91439" tIns="45719" rIns="91439" bIns="45719" numCol="1" spcCol="38100" rtlCol="0" anchor="t" upright="0">
+      <a:bodyPr rot="0" spcFirstLastPara="1" vertOverflow="overflow" horzOverflow="overflow" vert="horz" wrap="square" lIns="91439" tIns="45719" rIns="91439" bIns="45719" numCol="1" spcCol="38100" rtlCol="0" anchor="t">
         <a:noAutofit/>
       </a:bodyPr>
       <a:lstStyle>
@@ -4704,7 +4781,7 @@
           <a:buFontTx/>
           <a:buNone/>
           <a:tabLst/>
-          <a:defRPr b="0" baseline="0" cap="none" i="0" spc="0" strike="noStrike" sz="1800" u="none" kumimoji="0" normalizeH="0">
+          <a:defRPr kumimoji="0" sz="1800" b="0" i="0" u="none" strike="noStrike" cap="none" spc="0" normalizeH="0" baseline="0">
             <a:ln>
               <a:noFill/>
             </a:ln>
@@ -4730,7 +4807,7 @@
           <a:buFontTx/>
           <a:buNone/>
           <a:tabLst/>
-          <a:defRPr b="0" baseline="0" cap="none" i="0" spc="0" strike="noStrike" sz="1800" u="none" kumimoji="0" normalizeH="0">
+          <a:defRPr kumimoji="0" sz="1800" b="0" i="0" u="none" strike="noStrike" cap="none" spc="0" normalizeH="0" baseline="0">
             <a:ln>
               <a:noFill/>
             </a:ln>
@@ -4756,7 +4833,7 @@
           <a:buFontTx/>
           <a:buNone/>
           <a:tabLst/>
-          <a:defRPr b="0" baseline="0" cap="none" i="0" spc="0" strike="noStrike" sz="1800" u="none" kumimoji="0" normalizeH="0">
+          <a:defRPr kumimoji="0" sz="1800" b="0" i="0" u="none" strike="noStrike" cap="none" spc="0" normalizeH="0" baseline="0">
             <a:ln>
               <a:noFill/>
             </a:ln>
@@ -4782,7 +4859,7 @@
           <a:buFontTx/>
           <a:buNone/>
           <a:tabLst/>
-          <a:defRPr b="0" baseline="0" cap="none" i="0" spc="0" strike="noStrike" sz="1800" u="none" kumimoji="0" normalizeH="0">
+          <a:defRPr kumimoji="0" sz="1800" b="0" i="0" u="none" strike="noStrike" cap="none" spc="0" normalizeH="0" baseline="0">
             <a:ln>
               <a:noFill/>
             </a:ln>
@@ -4808,7 +4885,7 @@
           <a:buFontTx/>
           <a:buNone/>
           <a:tabLst/>
-          <a:defRPr b="0" baseline="0" cap="none" i="0" spc="0" strike="noStrike" sz="1800" u="none" kumimoji="0" normalizeH="0">
+          <a:defRPr kumimoji="0" sz="1800" b="0" i="0" u="none" strike="noStrike" cap="none" spc="0" normalizeH="0" baseline="0">
             <a:ln>
               <a:noFill/>
             </a:ln>
@@ -4834,7 +4911,7 @@
           <a:buFontTx/>
           <a:buNone/>
           <a:tabLst/>
-          <a:defRPr b="0" baseline="0" cap="none" i="0" spc="0" strike="noStrike" sz="1800" u="none" kumimoji="0" normalizeH="0">
+          <a:defRPr kumimoji="0" sz="1800" b="0" i="0" u="none" strike="noStrike" cap="none" spc="0" normalizeH="0" baseline="0">
             <a:ln>
               <a:noFill/>
             </a:ln>
@@ -4860,7 +4937,7 @@
           <a:buFontTx/>
           <a:buNone/>
           <a:tabLst/>
-          <a:defRPr b="0" baseline="0" cap="none" i="0" spc="0" strike="noStrike" sz="1800" u="none" kumimoji="0" normalizeH="0">
+          <a:defRPr kumimoji="0" sz="1800" b="0" i="0" u="none" strike="noStrike" cap="none" spc="0" normalizeH="0" baseline="0">
             <a:ln>
               <a:noFill/>
             </a:ln>
@@ -4886,7 +4963,7 @@
           <a:buFontTx/>
           <a:buNone/>
           <a:tabLst/>
-          <a:defRPr b="0" baseline="0" cap="none" i="0" spc="0" strike="noStrike" sz="1800" u="none" kumimoji="0" normalizeH="0">
+          <a:defRPr kumimoji="0" sz="1800" b="0" i="0" u="none" strike="noStrike" cap="none" spc="0" normalizeH="0" baseline="0">
             <a:ln>
               <a:noFill/>
             </a:ln>
@@ -4912,7 +4989,7 @@
           <a:buFontTx/>
           <a:buNone/>
           <a:tabLst/>
-          <a:defRPr b="0" baseline="0" cap="none" i="0" spc="0" strike="noStrike" sz="1800" u="none" kumimoji="0" normalizeH="0">
+          <a:defRPr kumimoji="0" sz="1800" b="0" i="0" u="none" strike="noStrike" cap="none" spc="0" normalizeH="0" baseline="0">
             <a:ln>
               <a:noFill/>
             </a:ln>
@@ -4938,7 +5015,7 @@
           <a:buFontTx/>
           <a:buNone/>
           <a:tabLst/>
-          <a:defRPr b="0" baseline="0" cap="none" i="0" spc="0" strike="noStrike" sz="1800" u="none" kumimoji="0" normalizeH="0">
+          <a:defRPr kumimoji="0" sz="1800" b="0" i="0" u="none" strike="noStrike" cap="none" spc="0" normalizeH="0" baseline="0">
             <a:ln>
               <a:noFill/>
             </a:ln>
@@ -4951,9 +5028,15 @@
         </a:lvl9pPr>
       </a:lstStyle>
       <a:style>
-        <a:lnRef idx="0"/>
-        <a:fillRef idx="0"/>
-        <a:effectRef idx="0"/>
+        <a:lnRef idx="0">
+          <a:scrgbClr r="0" g="0" b="0"/>
+        </a:lnRef>
+        <a:fillRef idx="0">
+          <a:scrgbClr r="0" g="0" b="0"/>
+        </a:fillRef>
+        <a:effectRef idx="0">
+          <a:scrgbClr r="0" g="0" b="0"/>
+        </a:effectRef>
         <a:fontRef idx="none"/>
       </a:style>
     </a:lnDef>
@@ -4967,7 +5050,7 @@
         <a:effectLst/>
         <a:sp3d/>
       </a:spPr>
-      <a:bodyPr rot="0" spcFirstLastPara="1" vertOverflow="overflow" horzOverflow="overflow" vert="horz" wrap="square" lIns="45718" tIns="45718" rIns="45718" bIns="45718" numCol="1" spcCol="38100" rtlCol="0" anchor="t" upright="0">
+      <a:bodyPr rot="0" spcFirstLastPara="1" vertOverflow="overflow" horzOverflow="overflow" vert="horz" wrap="square" lIns="45718" tIns="45718" rIns="45718" bIns="45718" numCol="1" spcCol="38100" rtlCol="0" anchor="t">
         <a:spAutoFit/>
       </a:bodyPr>
       <a:lstStyle>
@@ -4986,7 +5069,7 @@
           <a:buFontTx/>
           <a:buNone/>
           <a:tabLst/>
-          <a:defRPr b="0" baseline="0" cap="none" i="0" spc="0" strike="noStrike" sz="8600" u="none" kumimoji="0" normalizeH="0">
+          <a:defRPr kumimoji="0" sz="8600" b="0" i="0" u="none" strike="noStrike" cap="none" spc="0" normalizeH="0" baseline="0">
             <a:ln>
               <a:noFill/>
             </a:ln>
@@ -5016,7 +5099,7 @@
           <a:buFontTx/>
           <a:buNone/>
           <a:tabLst/>
-          <a:defRPr b="0" baseline="0" cap="none" i="0" spc="0" strike="noStrike" sz="1800" u="none" kumimoji="0" normalizeH="0">
+          <a:defRPr kumimoji="0" sz="1800" b="0" i="0" u="none" strike="noStrike" cap="none" spc="0" normalizeH="0" baseline="0">
             <a:ln>
               <a:noFill/>
             </a:ln>
@@ -5042,7 +5125,7 @@
           <a:buFontTx/>
           <a:buNone/>
           <a:tabLst/>
-          <a:defRPr b="0" baseline="0" cap="none" i="0" spc="0" strike="noStrike" sz="1800" u="none" kumimoji="0" normalizeH="0">
+          <a:defRPr kumimoji="0" sz="1800" b="0" i="0" u="none" strike="noStrike" cap="none" spc="0" normalizeH="0" baseline="0">
             <a:ln>
               <a:noFill/>
             </a:ln>
@@ -5068,7 +5151,7 @@
           <a:buFontTx/>
           <a:buNone/>
           <a:tabLst/>
-          <a:defRPr b="0" baseline="0" cap="none" i="0" spc="0" strike="noStrike" sz="1800" u="none" kumimoji="0" normalizeH="0">
+          <a:defRPr kumimoji="0" sz="1800" b="0" i="0" u="none" strike="noStrike" cap="none" spc="0" normalizeH="0" baseline="0">
             <a:ln>
               <a:noFill/>
             </a:ln>
@@ -5094,7 +5177,7 @@
           <a:buFontTx/>
           <a:buNone/>
           <a:tabLst/>
-          <a:defRPr b="0" baseline="0" cap="none" i="0" spc="0" strike="noStrike" sz="1800" u="none" kumimoji="0" normalizeH="0">
+          <a:defRPr kumimoji="0" sz="1800" b="0" i="0" u="none" strike="noStrike" cap="none" spc="0" normalizeH="0" baseline="0">
             <a:ln>
               <a:noFill/>
             </a:ln>
@@ -5120,7 +5203,7 @@
           <a:buFontTx/>
           <a:buNone/>
           <a:tabLst/>
-          <a:defRPr b="0" baseline="0" cap="none" i="0" spc="0" strike="noStrike" sz="1800" u="none" kumimoji="0" normalizeH="0">
+          <a:defRPr kumimoji="0" sz="1800" b="0" i="0" u="none" strike="noStrike" cap="none" spc="0" normalizeH="0" baseline="0">
             <a:ln>
               <a:noFill/>
             </a:ln>
@@ -5146,7 +5229,7 @@
           <a:buFontTx/>
           <a:buNone/>
           <a:tabLst/>
-          <a:defRPr b="0" baseline="0" cap="none" i="0" spc="0" strike="noStrike" sz="1800" u="none" kumimoji="0" normalizeH="0">
+          <a:defRPr kumimoji="0" sz="1800" b="0" i="0" u="none" strike="noStrike" cap="none" spc="0" normalizeH="0" baseline="0">
             <a:ln>
               <a:noFill/>
             </a:ln>
@@ -5172,7 +5255,7 @@
           <a:buFontTx/>
           <a:buNone/>
           <a:tabLst/>
-          <a:defRPr b="0" baseline="0" cap="none" i="0" spc="0" strike="noStrike" sz="1800" u="none" kumimoji="0" normalizeH="0">
+          <a:defRPr kumimoji="0" sz="1800" b="0" i="0" u="none" strike="noStrike" cap="none" spc="0" normalizeH="0" baseline="0">
             <a:ln>
               <a:noFill/>
             </a:ln>
@@ -5198,7 +5281,7 @@
           <a:buFontTx/>
           <a:buNone/>
           <a:tabLst/>
-          <a:defRPr b="0" baseline="0" cap="none" i="0" spc="0" strike="noStrike" sz="1800" u="none" kumimoji="0" normalizeH="0">
+          <a:defRPr kumimoji="0" sz="1800" b="0" i="0" u="none" strike="noStrike" cap="none" spc="0" normalizeH="0" baseline="0">
             <a:ln>
               <a:noFill/>
             </a:ln>
@@ -5224,7 +5307,7 @@
           <a:buFontTx/>
           <a:buNone/>
           <a:tabLst/>
-          <a:defRPr b="0" baseline="0" cap="none" i="0" spc="0" strike="noStrike" sz="1800" u="none" kumimoji="0" normalizeH="0">
+          <a:defRPr kumimoji="0" sz="1800" b="0" i="0" u="none" strike="noStrike" cap="none" spc="0" normalizeH="0" baseline="0">
             <a:ln>
               <a:noFill/>
             </a:ln>
@@ -5237,18 +5320,25 @@
         </a:lvl9pPr>
       </a:lstStyle>
       <a:style>
-        <a:lnRef idx="0"/>
-        <a:fillRef idx="0"/>
-        <a:effectRef idx="0"/>
+        <a:lnRef idx="0">
+          <a:scrgbClr r="0" g="0" b="0"/>
+        </a:lnRef>
+        <a:fillRef idx="0">
+          <a:scrgbClr r="0" g="0" b="0"/>
+        </a:fillRef>
+        <a:effectRef idx="0">
+          <a:scrgbClr r="0" g="0" b="0"/>
+        </a:effectRef>
         <a:fontRef idx="none"/>
       </a:style>
     </a:txDef>
   </a:objectDefaults>
+  <a:extraClrSchemeLst/>
 </a:theme>
 </file>
 
 <file path=ppt/theme/theme2.xml><?xml version="1.0" encoding="utf-8"?>
-<a:theme xmlns:a="http://schemas.openxmlformats.org/drawingml/2006/main" xmlns:r="http://schemas.openxmlformats.org/officeDocument/2006/relationships" name="Office Theme">
+<a:theme xmlns:a="http://schemas.openxmlformats.org/drawingml/2006/main" name="Office Theme">
   <a:themeElements>
     <a:clrScheme name="Office Theme">
       <a:dk1>
@@ -5374,7 +5464,7 @@
       <a:effectStyleLst>
         <a:effectStyle>
           <a:effectLst>
-            <a:outerShdw sx="100000" sy="100000" kx="0" ky="0" algn="b" rotWithShape="0" blurRad="38100" dist="23000" dir="5400000">
+            <a:outerShdw blurRad="38100" dist="23000" dir="5400000" rotWithShape="0">
               <a:srgbClr val="000000">
                 <a:alpha val="35000"/>
               </a:srgbClr>
@@ -5383,7 +5473,7 @@
         </a:effectStyle>
         <a:effectStyle>
           <a:effectLst>
-            <a:outerShdw sx="100000" sy="100000" kx="0" ky="0" algn="b" rotWithShape="0" blurRad="38100" dist="23000" dir="5400000">
+            <a:outerShdw blurRad="38100" dist="23000" dir="5400000" rotWithShape="0">
               <a:srgbClr val="000000">
                 <a:alpha val="35000"/>
               </a:srgbClr>
@@ -5392,7 +5482,7 @@
         </a:effectStyle>
         <a:effectStyle>
           <a:effectLst>
-            <a:outerShdw sx="100000" sy="100000" kx="0" ky="0" algn="b" rotWithShape="0" blurRad="38100" dist="23000" dir="5400000">
+            <a:outerShdw blurRad="38100" dist="23000" dir="5400000" rotWithShape="0">
               <a:srgbClr val="000000">
                 <a:alpha val="35000"/>
               </a:srgbClr>
@@ -5466,7 +5556,7 @@
           <a:round/>
         </a:ln>
         <a:effectLst>
-          <a:outerShdw sx="100000" sy="100000" kx="0" ky="0" algn="b" rotWithShape="0" blurRad="38100" dist="23000" dir="5400000">
+          <a:outerShdw blurRad="38100" dist="23000" dir="5400000" rotWithShape="0">
             <a:srgbClr val="000000">
               <a:alpha val="35000"/>
             </a:srgbClr>
@@ -5474,7 +5564,7 @@
         </a:effectLst>
         <a:sp3d/>
       </a:spPr>
-      <a:bodyPr rot="0" spcFirstLastPara="1" vertOverflow="overflow" horzOverflow="overflow" vert="horz" wrap="square" lIns="45718" tIns="45718" rIns="45718" bIns="45718" numCol="1" spcCol="38100" rtlCol="0" anchor="ctr" upright="0">
+      <a:bodyPr rot="0" spcFirstLastPara="1" vertOverflow="overflow" horzOverflow="overflow" vert="horz" wrap="square" lIns="45718" tIns="45718" rIns="45718" bIns="45718" numCol="1" spcCol="38100" rtlCol="0" anchor="ctr">
         <a:spAutoFit/>
       </a:bodyPr>
       <a:lstStyle>
@@ -5493,7 +5583,7 @@
           <a:buFontTx/>
           <a:buNone/>
           <a:tabLst/>
-          <a:defRPr b="0" baseline="0" cap="none" i="0" spc="0" strike="noStrike" sz="8600" u="none" kumimoji="0" normalizeH="0">
+          <a:defRPr kumimoji="0" sz="8600" b="0" i="0" u="none" strike="noStrike" cap="none" spc="0" normalizeH="0" baseline="0">
             <a:ln>
               <a:noFill/>
             </a:ln>
@@ -5523,7 +5613,7 @@
           <a:buFontTx/>
           <a:buNone/>
           <a:tabLst/>
-          <a:defRPr b="0" baseline="0" cap="none" i="0" spc="0" strike="noStrike" sz="1800" u="none" kumimoji="0" normalizeH="0">
+          <a:defRPr kumimoji="0" sz="1800" b="0" i="0" u="none" strike="noStrike" cap="none" spc="0" normalizeH="0" baseline="0">
             <a:ln>
               <a:noFill/>
             </a:ln>
@@ -5549,7 +5639,7 @@
           <a:buFontTx/>
           <a:buNone/>
           <a:tabLst/>
-          <a:defRPr b="0" baseline="0" cap="none" i="0" spc="0" strike="noStrike" sz="1800" u="none" kumimoji="0" normalizeH="0">
+          <a:defRPr kumimoji="0" sz="1800" b="0" i="0" u="none" strike="noStrike" cap="none" spc="0" normalizeH="0" baseline="0">
             <a:ln>
               <a:noFill/>
             </a:ln>
@@ -5575,7 +5665,7 @@
           <a:buFontTx/>
           <a:buNone/>
           <a:tabLst/>
-          <a:defRPr b="0" baseline="0" cap="none" i="0" spc="0" strike="noStrike" sz="1800" u="none" kumimoji="0" normalizeH="0">
+          <a:defRPr kumimoji="0" sz="1800" b="0" i="0" u="none" strike="noStrike" cap="none" spc="0" normalizeH="0" baseline="0">
             <a:ln>
               <a:noFill/>
             </a:ln>
@@ -5601,7 +5691,7 @@
           <a:buFontTx/>
           <a:buNone/>
           <a:tabLst/>
-          <a:defRPr b="0" baseline="0" cap="none" i="0" spc="0" strike="noStrike" sz="1800" u="none" kumimoji="0" normalizeH="0">
+          <a:defRPr kumimoji="0" sz="1800" b="0" i="0" u="none" strike="noStrike" cap="none" spc="0" normalizeH="0" baseline="0">
             <a:ln>
               <a:noFill/>
             </a:ln>
@@ -5627,7 +5717,7 @@
           <a:buFontTx/>
           <a:buNone/>
           <a:tabLst/>
-          <a:defRPr b="0" baseline="0" cap="none" i="0" spc="0" strike="noStrike" sz="1800" u="none" kumimoji="0" normalizeH="0">
+          <a:defRPr kumimoji="0" sz="1800" b="0" i="0" u="none" strike="noStrike" cap="none" spc="0" normalizeH="0" baseline="0">
             <a:ln>
               <a:noFill/>
             </a:ln>
@@ -5653,7 +5743,7 @@
           <a:buFontTx/>
           <a:buNone/>
           <a:tabLst/>
-          <a:defRPr b="0" baseline="0" cap="none" i="0" spc="0" strike="noStrike" sz="1800" u="none" kumimoji="0" normalizeH="0">
+          <a:defRPr kumimoji="0" sz="1800" b="0" i="0" u="none" strike="noStrike" cap="none" spc="0" normalizeH="0" baseline="0">
             <a:ln>
               <a:noFill/>
             </a:ln>
@@ -5679,7 +5769,7 @@
           <a:buFontTx/>
           <a:buNone/>
           <a:tabLst/>
-          <a:defRPr b="0" baseline="0" cap="none" i="0" spc="0" strike="noStrike" sz="1800" u="none" kumimoji="0" normalizeH="0">
+          <a:defRPr kumimoji="0" sz="1800" b="0" i="0" u="none" strike="noStrike" cap="none" spc="0" normalizeH="0" baseline="0">
             <a:ln>
               <a:noFill/>
             </a:ln>
@@ -5705,7 +5795,7 @@
           <a:buFontTx/>
           <a:buNone/>
           <a:tabLst/>
-          <a:defRPr b="0" baseline="0" cap="none" i="0" spc="0" strike="noStrike" sz="1800" u="none" kumimoji="0" normalizeH="0">
+          <a:defRPr kumimoji="0" sz="1800" b="0" i="0" u="none" strike="noStrike" cap="none" spc="0" normalizeH="0" baseline="0">
             <a:ln>
               <a:noFill/>
             </a:ln>
@@ -5731,7 +5821,7 @@
           <a:buFontTx/>
           <a:buNone/>
           <a:tabLst/>
-          <a:defRPr b="0" baseline="0" cap="none" i="0" spc="0" strike="noStrike" sz="1800" u="none" kumimoji="0" normalizeH="0">
+          <a:defRPr kumimoji="0" sz="1800" b="0" i="0" u="none" strike="noStrike" cap="none" spc="0" normalizeH="0" baseline="0">
             <a:ln>
               <a:noFill/>
             </a:ln>
@@ -5744,9 +5834,15 @@
         </a:lvl9pPr>
       </a:lstStyle>
       <a:style>
-        <a:lnRef idx="0"/>
-        <a:fillRef idx="0"/>
-        <a:effectRef idx="0"/>
+        <a:lnRef idx="0">
+          <a:scrgbClr r="0" g="0" b="0"/>
+        </a:lnRef>
+        <a:fillRef idx="0">
+          <a:scrgbClr r="0" g="0" b="0"/>
+        </a:fillRef>
+        <a:effectRef idx="0">
+          <a:scrgbClr r="0" g="0" b="0"/>
+        </a:effectRef>
         <a:fontRef idx="none"/>
       </a:style>
     </a:spDef>
@@ -5761,7 +5857,7 @@
           <a:round/>
         </a:ln>
         <a:effectLst>
-          <a:outerShdw sx="100000" sy="100000" kx="0" ky="0" algn="b" rotWithShape="0" blurRad="38100" dist="23000" dir="5400000">
+          <a:outerShdw blurRad="38100" dist="23000" dir="5400000" rotWithShape="0">
             <a:srgbClr val="000000">
               <a:alpha val="35000"/>
             </a:srgbClr>
@@ -5769,7 +5865,7 @@
         </a:effectLst>
         <a:sp3d/>
       </a:spPr>
-      <a:bodyPr rot="0" spcFirstLastPara="1" vertOverflow="overflow" horzOverflow="overflow" vert="horz" wrap="square" lIns="91439" tIns="45719" rIns="91439" bIns="45719" numCol="1" spcCol="38100" rtlCol="0" anchor="t" upright="0">
+      <a:bodyPr rot="0" spcFirstLastPara="1" vertOverflow="overflow" horzOverflow="overflow" vert="horz" wrap="square" lIns="91439" tIns="45719" rIns="91439" bIns="45719" numCol="1" spcCol="38100" rtlCol="0" anchor="t">
         <a:noAutofit/>
       </a:bodyPr>
       <a:lstStyle>
@@ -5788,7 +5884,7 @@
           <a:buFontTx/>
           <a:buNone/>
           <a:tabLst/>
-          <a:defRPr b="0" baseline="0" cap="none" i="0" spc="0" strike="noStrike" sz="1800" u="none" kumimoji="0" normalizeH="0">
+          <a:defRPr kumimoji="0" sz="1800" b="0" i="0" u="none" strike="noStrike" cap="none" spc="0" normalizeH="0" baseline="0">
             <a:ln>
               <a:noFill/>
             </a:ln>
@@ -5814,7 +5910,7 @@
           <a:buFontTx/>
           <a:buNone/>
           <a:tabLst/>
-          <a:defRPr b="0" baseline="0" cap="none" i="0" spc="0" strike="noStrike" sz="1800" u="none" kumimoji="0" normalizeH="0">
+          <a:defRPr kumimoji="0" sz="1800" b="0" i="0" u="none" strike="noStrike" cap="none" spc="0" normalizeH="0" baseline="0">
             <a:ln>
               <a:noFill/>
             </a:ln>
@@ -5840,7 +5936,7 @@
           <a:buFontTx/>
           <a:buNone/>
           <a:tabLst/>
-          <a:defRPr b="0" baseline="0" cap="none" i="0" spc="0" strike="noStrike" sz="1800" u="none" kumimoji="0" normalizeH="0">
+          <a:defRPr kumimoji="0" sz="1800" b="0" i="0" u="none" strike="noStrike" cap="none" spc="0" normalizeH="0" baseline="0">
             <a:ln>
               <a:noFill/>
             </a:ln>
@@ -5866,7 +5962,7 @@
           <a:buFontTx/>
           <a:buNone/>
           <a:tabLst/>
-          <a:defRPr b="0" baseline="0" cap="none" i="0" spc="0" strike="noStrike" sz="1800" u="none" kumimoji="0" normalizeH="0">
+          <a:defRPr kumimoji="0" sz="1800" b="0" i="0" u="none" strike="noStrike" cap="none" spc="0" normalizeH="0" baseline="0">
             <a:ln>
               <a:noFill/>
             </a:ln>
@@ -5892,7 +5988,7 @@
           <a:buFontTx/>
           <a:buNone/>
           <a:tabLst/>
-          <a:defRPr b="0" baseline="0" cap="none" i="0" spc="0" strike="noStrike" sz="1800" u="none" kumimoji="0" normalizeH="0">
+          <a:defRPr kumimoji="0" sz="1800" b="0" i="0" u="none" strike="noStrike" cap="none" spc="0" normalizeH="0" baseline="0">
             <a:ln>
               <a:noFill/>
             </a:ln>
@@ -5918,7 +6014,7 @@
           <a:buFontTx/>
           <a:buNone/>
           <a:tabLst/>
-          <a:defRPr b="0" baseline="0" cap="none" i="0" spc="0" strike="noStrike" sz="1800" u="none" kumimoji="0" normalizeH="0">
+          <a:defRPr kumimoji="0" sz="1800" b="0" i="0" u="none" strike="noStrike" cap="none" spc="0" normalizeH="0" baseline="0">
             <a:ln>
               <a:noFill/>
             </a:ln>
@@ -5944,7 +6040,7 @@
           <a:buFontTx/>
           <a:buNone/>
           <a:tabLst/>
-          <a:defRPr b="0" baseline="0" cap="none" i="0" spc="0" strike="noStrike" sz="1800" u="none" kumimoji="0" normalizeH="0">
+          <a:defRPr kumimoji="0" sz="1800" b="0" i="0" u="none" strike="noStrike" cap="none" spc="0" normalizeH="0" baseline="0">
             <a:ln>
               <a:noFill/>
             </a:ln>
@@ -5970,7 +6066,7 @@
           <a:buFontTx/>
           <a:buNone/>
           <a:tabLst/>
-          <a:defRPr b="0" baseline="0" cap="none" i="0" spc="0" strike="noStrike" sz="1800" u="none" kumimoji="0" normalizeH="0">
+          <a:defRPr kumimoji="0" sz="1800" b="0" i="0" u="none" strike="noStrike" cap="none" spc="0" normalizeH="0" baseline="0">
             <a:ln>
               <a:noFill/>
             </a:ln>
@@ -5996,7 +6092,7 @@
           <a:buFontTx/>
           <a:buNone/>
           <a:tabLst/>
-          <a:defRPr b="0" baseline="0" cap="none" i="0" spc="0" strike="noStrike" sz="1800" u="none" kumimoji="0" normalizeH="0">
+          <a:defRPr kumimoji="0" sz="1800" b="0" i="0" u="none" strike="noStrike" cap="none" spc="0" normalizeH="0" baseline="0">
             <a:ln>
               <a:noFill/>
             </a:ln>
@@ -6022,7 +6118,7 @@
           <a:buFontTx/>
           <a:buNone/>
           <a:tabLst/>
-          <a:defRPr b="0" baseline="0" cap="none" i="0" spc="0" strike="noStrike" sz="1800" u="none" kumimoji="0" normalizeH="0">
+          <a:defRPr kumimoji="0" sz="1800" b="0" i="0" u="none" strike="noStrike" cap="none" spc="0" normalizeH="0" baseline="0">
             <a:ln>
               <a:noFill/>
             </a:ln>
@@ -6035,9 +6131,15 @@
         </a:lvl9pPr>
       </a:lstStyle>
       <a:style>
-        <a:lnRef idx="0"/>
-        <a:fillRef idx="0"/>
-        <a:effectRef idx="0"/>
+        <a:lnRef idx="0">
+          <a:scrgbClr r="0" g="0" b="0"/>
+        </a:lnRef>
+        <a:fillRef idx="0">
+          <a:scrgbClr r="0" g="0" b="0"/>
+        </a:fillRef>
+        <a:effectRef idx="0">
+          <a:scrgbClr r="0" g="0" b="0"/>
+        </a:effectRef>
         <a:fontRef idx="none"/>
       </a:style>
     </a:lnDef>
@@ -6051,7 +6153,7 @@
         <a:effectLst/>
         <a:sp3d/>
       </a:spPr>
-      <a:bodyPr rot="0" spcFirstLastPara="1" vertOverflow="overflow" horzOverflow="overflow" vert="horz" wrap="square" lIns="45718" tIns="45718" rIns="45718" bIns="45718" numCol="1" spcCol="38100" rtlCol="0" anchor="t" upright="0">
+      <a:bodyPr rot="0" spcFirstLastPara="1" vertOverflow="overflow" horzOverflow="overflow" vert="horz" wrap="square" lIns="45718" tIns="45718" rIns="45718" bIns="45718" numCol="1" spcCol="38100" rtlCol="0" anchor="t">
         <a:spAutoFit/>
       </a:bodyPr>
       <a:lstStyle>
@@ -6070,7 +6172,7 @@
           <a:buFontTx/>
           <a:buNone/>
           <a:tabLst/>
-          <a:defRPr b="0" baseline="0" cap="none" i="0" spc="0" strike="noStrike" sz="8600" u="none" kumimoji="0" normalizeH="0">
+          <a:defRPr kumimoji="0" sz="8600" b="0" i="0" u="none" strike="noStrike" cap="none" spc="0" normalizeH="0" baseline="0">
             <a:ln>
               <a:noFill/>
             </a:ln>
@@ -6100,7 +6202,7 @@
           <a:buFontTx/>
           <a:buNone/>
           <a:tabLst/>
-          <a:defRPr b="0" baseline="0" cap="none" i="0" spc="0" strike="noStrike" sz="1800" u="none" kumimoji="0" normalizeH="0">
+          <a:defRPr kumimoji="0" sz="1800" b="0" i="0" u="none" strike="noStrike" cap="none" spc="0" normalizeH="0" baseline="0">
             <a:ln>
               <a:noFill/>
             </a:ln>
@@ -6126,7 +6228,7 @@
           <a:buFontTx/>
           <a:buNone/>
           <a:tabLst/>
-          <a:defRPr b="0" baseline="0" cap="none" i="0" spc="0" strike="noStrike" sz="1800" u="none" kumimoji="0" normalizeH="0">
+          <a:defRPr kumimoji="0" sz="1800" b="0" i="0" u="none" strike="noStrike" cap="none" spc="0" normalizeH="0" baseline="0">
             <a:ln>
               <a:noFill/>
             </a:ln>
@@ -6152,7 +6254,7 @@
           <a:buFontTx/>
           <a:buNone/>
           <a:tabLst/>
-          <a:defRPr b="0" baseline="0" cap="none" i="0" spc="0" strike="noStrike" sz="1800" u="none" kumimoji="0" normalizeH="0">
+          <a:defRPr kumimoji="0" sz="1800" b="0" i="0" u="none" strike="noStrike" cap="none" spc="0" normalizeH="0" baseline="0">
             <a:ln>
               <a:noFill/>
             </a:ln>
@@ -6178,7 +6280,7 @@
           <a:buFontTx/>
           <a:buNone/>
           <a:tabLst/>
-          <a:defRPr b="0" baseline="0" cap="none" i="0" spc="0" strike="noStrike" sz="1800" u="none" kumimoji="0" normalizeH="0">
+          <a:defRPr kumimoji="0" sz="1800" b="0" i="0" u="none" strike="noStrike" cap="none" spc="0" normalizeH="0" baseline="0">
             <a:ln>
               <a:noFill/>
             </a:ln>
@@ -6204,7 +6306,7 @@
           <a:buFontTx/>
           <a:buNone/>
           <a:tabLst/>
-          <a:defRPr b="0" baseline="0" cap="none" i="0" spc="0" strike="noStrike" sz="1800" u="none" kumimoji="0" normalizeH="0">
+          <a:defRPr kumimoji="0" sz="1800" b="0" i="0" u="none" strike="noStrike" cap="none" spc="0" normalizeH="0" baseline="0">
             <a:ln>
               <a:noFill/>
             </a:ln>
@@ -6230,7 +6332,7 @@
           <a:buFontTx/>
           <a:buNone/>
           <a:tabLst/>
-          <a:defRPr b="0" baseline="0" cap="none" i="0" spc="0" strike="noStrike" sz="1800" u="none" kumimoji="0" normalizeH="0">
+          <a:defRPr kumimoji="0" sz="1800" b="0" i="0" u="none" strike="noStrike" cap="none" spc="0" normalizeH="0" baseline="0">
             <a:ln>
               <a:noFill/>
             </a:ln>
@@ -6256,7 +6358,7 @@
           <a:buFontTx/>
           <a:buNone/>
           <a:tabLst/>
-          <a:defRPr b="0" baseline="0" cap="none" i="0" spc="0" strike="noStrike" sz="1800" u="none" kumimoji="0" normalizeH="0">
+          <a:defRPr kumimoji="0" sz="1800" b="0" i="0" u="none" strike="noStrike" cap="none" spc="0" normalizeH="0" baseline="0">
             <a:ln>
               <a:noFill/>
             </a:ln>
@@ -6282,7 +6384,7 @@
           <a:buFontTx/>
           <a:buNone/>
           <a:tabLst/>
-          <a:defRPr b="0" baseline="0" cap="none" i="0" spc="0" strike="noStrike" sz="1800" u="none" kumimoji="0" normalizeH="0">
+          <a:defRPr kumimoji="0" sz="1800" b="0" i="0" u="none" strike="noStrike" cap="none" spc="0" normalizeH="0" baseline="0">
             <a:ln>
               <a:noFill/>
             </a:ln>
@@ -6308,7 +6410,7 @@
           <a:buFontTx/>
           <a:buNone/>
           <a:tabLst/>
-          <a:defRPr b="0" baseline="0" cap="none" i="0" spc="0" strike="noStrike" sz="1800" u="none" kumimoji="0" normalizeH="0">
+          <a:defRPr kumimoji="0" sz="1800" b="0" i="0" u="none" strike="noStrike" cap="none" spc="0" normalizeH="0" baseline="0">
             <a:ln>
               <a:noFill/>
             </a:ln>
@@ -6321,12 +6423,19 @@
         </a:lvl9pPr>
       </a:lstStyle>
       <a:style>
-        <a:lnRef idx="0"/>
-        <a:fillRef idx="0"/>
-        <a:effectRef idx="0"/>
+        <a:lnRef idx="0">
+          <a:scrgbClr r="0" g="0" b="0"/>
+        </a:lnRef>
+        <a:fillRef idx="0">
+          <a:scrgbClr r="0" g="0" b="0"/>
+        </a:fillRef>
+        <a:effectRef idx="0">
+          <a:scrgbClr r="0" g="0" b="0"/>
+        </a:effectRef>
         <a:fontRef idx="none"/>
       </a:style>
     </a:txDef>
   </a:objectDefaults>
+  <a:extraClrSchemeLst/>
 </a:theme>
 </file>
</xml_diff>